<commit_message>
update of the file
</commit_message>
<xml_diff>
--- a/PS02/Final Project-VisualTech.pptx
+++ b/PS02/Final Project-VisualTech.pptx
@@ -111,6 +111,11 @@
       </a:defRPr>
     </a:lvl9pPr>
   </p:defaultTextStyle>
+  <p:extLst>
+    <p:ext uri="{EFAFB233-063F-42B5-8137-9DF3F51BA10A}">
+      <p15:sldGuideLst xmlns:p15="http://schemas.microsoft.com/office/powerpoint/2012/main"/>
+    </p:ext>
+  </p:extLst>
 </p:presentation>
 </file>
 
@@ -196,7 +201,7 @@
           <a:p>
             <a:fld id="{4993B7B4-03FD-384B-9630-3DAF84717B34}" type="datetimeFigureOut">
               <a:rPr lang="en-US" smtClean="0"/>
-              <a:t>11/11/17</a:t>
+              <a:t>11/12/17</a:t>
             </a:fld>
             <a:endParaRPr lang="en-US"/>
           </a:p>
@@ -847,7 +852,7 @@
           <a:p>
             <a:fld id="{1E655F4A-45FD-154A-BB7A-93D28B32DE11}" type="datetimeFigureOut">
               <a:rPr lang="en-US" smtClean="0"/>
-              <a:t>11/11/17</a:t>
+              <a:t>11/12/17</a:t>
             </a:fld>
             <a:endParaRPr lang="en-US"/>
           </a:p>
@@ -1017,7 +1022,7 @@
           <a:p>
             <a:fld id="{1E655F4A-45FD-154A-BB7A-93D28B32DE11}" type="datetimeFigureOut">
               <a:rPr lang="en-US" smtClean="0"/>
-              <a:t>11/11/17</a:t>
+              <a:t>11/12/17</a:t>
             </a:fld>
             <a:endParaRPr lang="en-US"/>
           </a:p>
@@ -1197,7 +1202,7 @@
           <a:p>
             <a:fld id="{1E655F4A-45FD-154A-BB7A-93D28B32DE11}" type="datetimeFigureOut">
               <a:rPr lang="en-US" smtClean="0"/>
-              <a:t>11/11/17</a:t>
+              <a:t>11/12/17</a:t>
             </a:fld>
             <a:endParaRPr lang="en-US"/>
           </a:p>
@@ -1367,7 +1372,7 @@
           <a:p>
             <a:fld id="{1E655F4A-45FD-154A-BB7A-93D28B32DE11}" type="datetimeFigureOut">
               <a:rPr lang="en-US" smtClean="0"/>
-              <a:t>11/11/17</a:t>
+              <a:t>11/12/17</a:t>
             </a:fld>
             <a:endParaRPr lang="en-US"/>
           </a:p>
@@ -1613,7 +1618,7 @@
           <a:p>
             <a:fld id="{1E655F4A-45FD-154A-BB7A-93D28B32DE11}" type="datetimeFigureOut">
               <a:rPr lang="en-US" smtClean="0"/>
-              <a:t>11/11/17</a:t>
+              <a:t>11/12/17</a:t>
             </a:fld>
             <a:endParaRPr lang="en-US"/>
           </a:p>
@@ -1845,7 +1850,7 @@
           <a:p>
             <a:fld id="{1E655F4A-45FD-154A-BB7A-93D28B32DE11}" type="datetimeFigureOut">
               <a:rPr lang="en-US" smtClean="0"/>
-              <a:t>11/11/17</a:t>
+              <a:t>11/12/17</a:t>
             </a:fld>
             <a:endParaRPr lang="en-US"/>
           </a:p>
@@ -2212,7 +2217,7 @@
           <a:p>
             <a:fld id="{1E655F4A-45FD-154A-BB7A-93D28B32DE11}" type="datetimeFigureOut">
               <a:rPr lang="en-US" smtClean="0"/>
-              <a:t>11/11/17</a:t>
+              <a:t>11/12/17</a:t>
             </a:fld>
             <a:endParaRPr lang="en-US"/>
           </a:p>
@@ -2330,7 +2335,7 @@
           <a:p>
             <a:fld id="{1E655F4A-45FD-154A-BB7A-93D28B32DE11}" type="datetimeFigureOut">
               <a:rPr lang="en-US" smtClean="0"/>
-              <a:t>11/11/17</a:t>
+              <a:t>11/12/17</a:t>
             </a:fld>
             <a:endParaRPr lang="en-US"/>
           </a:p>
@@ -2425,7 +2430,7 @@
           <a:p>
             <a:fld id="{1E655F4A-45FD-154A-BB7A-93D28B32DE11}" type="datetimeFigureOut">
               <a:rPr lang="en-US" smtClean="0"/>
-              <a:t>11/11/17</a:t>
+              <a:t>11/12/17</a:t>
             </a:fld>
             <a:endParaRPr lang="en-US"/>
           </a:p>
@@ -2702,7 +2707,7 @@
           <a:p>
             <a:fld id="{1E655F4A-45FD-154A-BB7A-93D28B32DE11}" type="datetimeFigureOut">
               <a:rPr lang="en-US" smtClean="0"/>
-              <a:t>11/11/17</a:t>
+              <a:t>11/12/17</a:t>
             </a:fld>
             <a:endParaRPr lang="en-US"/>
           </a:p>
@@ -2955,7 +2960,7 @@
           <a:p>
             <a:fld id="{1E655F4A-45FD-154A-BB7A-93D28B32DE11}" type="datetimeFigureOut">
               <a:rPr lang="en-US" smtClean="0"/>
-              <a:t>11/11/17</a:t>
+              <a:t>11/12/17</a:t>
             </a:fld>
             <a:endParaRPr lang="en-US"/>
           </a:p>
@@ -3168,7 +3173,7 @@
           <a:p>
             <a:fld id="{1E655F4A-45FD-154A-BB7A-93D28B32DE11}" type="datetimeFigureOut">
               <a:rPr lang="en-US" smtClean="0"/>
-              <a:t>11/11/17</a:t>
+              <a:t>11/12/17</a:t>
             </a:fld>
             <a:endParaRPr lang="en-US"/>
           </a:p>
@@ -4034,7 +4039,7 @@
                 <a:ea typeface="Abadi MT Condensed Extra Bold" charset="0"/>
                 <a:cs typeface="Abadi MT Condensed Extra Bold" charset="0"/>
               </a:rPr>
-              <a:t>Boston</a:t>
+              <a:t>Big</a:t>
             </a:r>
             <a:r>
               <a:rPr lang="zh-CN" altLang="en-US" sz="2000" dirty="0" smtClean="0">
@@ -4056,7 +4061,7 @@
                 <a:ea typeface="Abadi MT Condensed Extra Bold" charset="0"/>
                 <a:cs typeface="Abadi MT Condensed Extra Bold" charset="0"/>
               </a:rPr>
-              <a:t>at</a:t>
+              <a:t>City</a:t>
             </a:r>
             <a:r>
               <a:rPr lang="zh-CN" altLang="en-US" sz="2000" dirty="0" smtClean="0">
@@ -4078,7 +4083,7 @@
                 <a:ea typeface="Abadi MT Condensed Extra Bold" charset="0"/>
                 <a:cs typeface="Abadi MT Condensed Extra Bold" charset="0"/>
               </a:rPr>
-              <a:t>different</a:t>
+              <a:t>in</a:t>
             </a:r>
             <a:r>
               <a:rPr lang="zh-CN" altLang="en-US" sz="2000" dirty="0" smtClean="0">
@@ -4100,7 +4105,29 @@
                 <a:ea typeface="Abadi MT Condensed Extra Bold" charset="0"/>
                 <a:cs typeface="Abadi MT Condensed Extra Bold" charset="0"/>
               </a:rPr>
-              <a:t>neighborhood</a:t>
+              <a:t>the</a:t>
+            </a:r>
+            <a:r>
+              <a:rPr lang="zh-CN" altLang="en-US" sz="2000" dirty="0" smtClean="0">
+                <a:solidFill>
+                  <a:schemeClr val="bg1"/>
+                </a:solidFill>
+                <a:latin typeface="Abadi MT Condensed Extra Bold" charset="0"/>
+                <a:ea typeface="Abadi MT Condensed Extra Bold" charset="0"/>
+                <a:cs typeface="Abadi MT Condensed Extra Bold" charset="0"/>
+              </a:rPr>
+              <a:t> </a:t>
+            </a:r>
+            <a:r>
+              <a:rPr lang="en-US" altLang="zh-CN" sz="2000" dirty="0" smtClean="0">
+                <a:solidFill>
+                  <a:schemeClr val="bg1"/>
+                </a:solidFill>
+                <a:latin typeface="Abadi MT Condensed Extra Bold" charset="0"/>
+                <a:ea typeface="Abadi MT Condensed Extra Bold" charset="0"/>
+                <a:cs typeface="Abadi MT Condensed Extra Bold" charset="0"/>
+              </a:rPr>
+              <a:t>World</a:t>
             </a:r>
             <a:endParaRPr lang="en-US" sz="2000" dirty="0">
               <a:solidFill>
@@ -4788,19 +4815,6 @@
               <a:t> </a:t>
             </a:r>
             <a:r>
-              <a:rPr lang="en-US" altLang="zh-CN" sz="3200" dirty="0">
-                <a:solidFill>
-                  <a:schemeClr val="accent1">
-                    <a:lumMod val="50000"/>
-                  </a:schemeClr>
-                </a:solidFill>
-                <a:latin typeface="Abadi MT Condensed Extra Bold" charset="0"/>
-                <a:ea typeface="Abadi MT Condensed Extra Bold" charset="0"/>
-                <a:cs typeface="Abadi MT Condensed Extra Bold" charset="0"/>
-              </a:rPr>
-              <a:t>N</a:t>
-            </a:r>
-            <a:r>
               <a:rPr lang="en-US" altLang="zh-CN" sz="3200" dirty="0" smtClean="0">
                 <a:solidFill>
                   <a:schemeClr val="accent1">
@@ -4811,7 +4825,7 @@
                 <a:ea typeface="Abadi MT Condensed Extra Bold" charset="0"/>
                 <a:cs typeface="Abadi MT Condensed Extra Bold" charset="0"/>
               </a:rPr>
-              <a:t>eighborhood</a:t>
+              <a:t>City</a:t>
             </a:r>
             <a:endParaRPr lang="en-US" sz="3200" dirty="0">
               <a:solidFill>
@@ -6103,7 +6117,7 @@
         <p:spPr>
           <a:xfrm>
             <a:off x="863918" y="1792929"/>
-            <a:ext cx="3620735" cy="2215991"/>
+            <a:ext cx="3620735" cy="3200876"/>
           </a:xfrm>
           <a:prstGeom prst="rect">
             <a:avLst/>
@@ -6265,6 +6279,118 @@
             </a:r>
           </a:p>
           <a:p>
+            <a:pPr marL="742950" lvl="1" indent="-285750">
+              <a:buFont typeface="Arial" charset="0"/>
+              <a:buChar char="•"/>
+            </a:pPr>
+            <a:r>
+              <a:rPr lang="en-US" altLang="zh-CN" sz="1600" dirty="0" smtClean="0">
+                <a:solidFill>
+                  <a:schemeClr val="accent1">
+                    <a:lumMod val="50000"/>
+                  </a:schemeClr>
+                </a:solidFill>
+                <a:latin typeface="Abadi MT Condensed Extra Bold" charset="0"/>
+                <a:ea typeface="Abadi MT Condensed Extra Bold" charset="0"/>
+                <a:cs typeface="Abadi MT Condensed Extra Bold" charset="0"/>
+              </a:rPr>
+              <a:t>Boston</a:t>
+            </a:r>
+          </a:p>
+          <a:p>
+            <a:pPr marL="742950" lvl="1" indent="-285750">
+              <a:buFont typeface="Arial" charset="0"/>
+              <a:buChar char="•"/>
+            </a:pPr>
+            <a:r>
+              <a:rPr lang="en-US" altLang="zh-CN" sz="1600" dirty="0" smtClean="0">
+                <a:solidFill>
+                  <a:schemeClr val="accent1">
+                    <a:lumMod val="50000"/>
+                  </a:schemeClr>
+                </a:solidFill>
+                <a:latin typeface="Abadi MT Condensed Extra Bold" charset="0"/>
+                <a:ea typeface="Abadi MT Condensed Extra Bold" charset="0"/>
+                <a:cs typeface="Abadi MT Condensed Extra Bold" charset="0"/>
+              </a:rPr>
+              <a:t>New</a:t>
+            </a:r>
+            <a:r>
+              <a:rPr lang="zh-CN" altLang="en-US" sz="1600" dirty="0" smtClean="0">
+                <a:solidFill>
+                  <a:schemeClr val="accent1">
+                    <a:lumMod val="50000"/>
+                  </a:schemeClr>
+                </a:solidFill>
+                <a:latin typeface="Abadi MT Condensed Extra Bold" charset="0"/>
+                <a:ea typeface="Abadi MT Condensed Extra Bold" charset="0"/>
+                <a:cs typeface="Abadi MT Condensed Extra Bold" charset="0"/>
+              </a:rPr>
+              <a:t> </a:t>
+            </a:r>
+            <a:r>
+              <a:rPr lang="en-US" altLang="zh-CN" sz="1600" dirty="0" smtClean="0">
+                <a:solidFill>
+                  <a:schemeClr val="accent1">
+                    <a:lumMod val="50000"/>
+                  </a:schemeClr>
+                </a:solidFill>
+                <a:latin typeface="Abadi MT Condensed Extra Bold" charset="0"/>
+                <a:ea typeface="Abadi MT Condensed Extra Bold" charset="0"/>
+                <a:cs typeface="Abadi MT Condensed Extra Bold" charset="0"/>
+              </a:rPr>
+              <a:t>York</a:t>
+            </a:r>
+          </a:p>
+          <a:p>
+            <a:pPr marL="742950" lvl="1" indent="-285750">
+              <a:buFont typeface="Arial" charset="0"/>
+              <a:buChar char="•"/>
+            </a:pPr>
+            <a:r>
+              <a:rPr lang="en-US" altLang="zh-CN" sz="1600" dirty="0" smtClean="0">
+                <a:solidFill>
+                  <a:schemeClr val="accent1">
+                    <a:lumMod val="50000"/>
+                  </a:schemeClr>
+                </a:solidFill>
+                <a:latin typeface="Abadi MT Condensed Extra Bold" charset="0"/>
+                <a:ea typeface="Abadi MT Condensed Extra Bold" charset="0"/>
+                <a:cs typeface="Abadi MT Condensed Extra Bold" charset="0"/>
+              </a:rPr>
+              <a:t>Shanghai</a:t>
+            </a:r>
+          </a:p>
+          <a:p>
+            <a:pPr marL="742950" lvl="1" indent="-285750">
+              <a:buFont typeface="Arial" charset="0"/>
+              <a:buChar char="•"/>
+            </a:pPr>
+            <a:r>
+              <a:rPr lang="en-US" altLang="zh-CN" sz="1600" dirty="0" smtClean="0">
+                <a:solidFill>
+                  <a:schemeClr val="accent1">
+                    <a:lumMod val="50000"/>
+                  </a:schemeClr>
+                </a:solidFill>
+                <a:latin typeface="Abadi MT Condensed Extra Bold" charset="0"/>
+                <a:ea typeface="Abadi MT Condensed Extra Bold" charset="0"/>
+                <a:cs typeface="Abadi MT Condensed Extra Bold" charset="0"/>
+              </a:rPr>
+              <a:t>Tokyo</a:t>
+            </a:r>
+            <a:endParaRPr lang="en-US" altLang="zh-CN" sz="2000" dirty="0" smtClean="0">
+              <a:solidFill>
+                <a:schemeClr val="accent1">
+                  <a:lumMod val="50000"/>
+                </a:schemeClr>
+              </a:solidFill>
+              <a:latin typeface="Abadi MT Condensed Extra Bold" charset="0"/>
+              <a:ea typeface="Abadi MT Condensed Extra Bold" charset="0"/>
+              <a:cs typeface="Abadi MT Condensed Extra Bold" charset="0"/>
+            </a:endParaRPr>
+          </a:p>
+          <a:p>
             <a:r>
               <a:rPr lang="en-US" altLang="zh-CN" sz="2000" dirty="0" smtClean="0">
                 <a:solidFill>
@@ -6276,7 +6402,111 @@
                 <a:ea typeface="Abadi MT Condensed Extra Bold" charset="0"/>
                 <a:cs typeface="Abadi MT Condensed Extra Bold" charset="0"/>
               </a:rPr>
-              <a:t>Map</a:t>
+              <a:t>Map:</a:t>
+            </a:r>
+            <a:r>
+              <a:rPr lang="zh-CN" altLang="en-US" sz="2000" dirty="0" smtClean="0">
+                <a:solidFill>
+                  <a:schemeClr val="accent1">
+                    <a:lumMod val="50000"/>
+                  </a:schemeClr>
+                </a:solidFill>
+                <a:latin typeface="Abadi MT Condensed Extra Bold" charset="0"/>
+                <a:ea typeface="Abadi MT Condensed Extra Bold" charset="0"/>
+                <a:cs typeface="Abadi MT Condensed Extra Bold" charset="0"/>
+              </a:rPr>
+              <a:t> </a:t>
+            </a:r>
+            <a:r>
+              <a:rPr lang="en-US" altLang="zh-CN" sz="2000" dirty="0" smtClean="0">
+                <a:solidFill>
+                  <a:schemeClr val="accent1">
+                    <a:lumMod val="50000"/>
+                  </a:schemeClr>
+                </a:solidFill>
+                <a:latin typeface="Abadi MT Condensed Extra Bold" charset="0"/>
+                <a:ea typeface="Abadi MT Condensed Extra Bold" charset="0"/>
+                <a:cs typeface="Abadi MT Condensed Extra Bold" charset="0"/>
+              </a:rPr>
+              <a:t>maps</a:t>
+            </a:r>
+            <a:r>
+              <a:rPr lang="zh-CN" altLang="en-US" sz="2000" dirty="0" smtClean="0">
+                <a:solidFill>
+                  <a:schemeClr val="accent1">
+                    <a:lumMod val="50000"/>
+                  </a:schemeClr>
+                </a:solidFill>
+                <a:latin typeface="Abadi MT Condensed Extra Bold" charset="0"/>
+                <a:ea typeface="Abadi MT Condensed Extra Bold" charset="0"/>
+                <a:cs typeface="Abadi MT Condensed Extra Bold" charset="0"/>
+              </a:rPr>
+              <a:t> </a:t>
+            </a:r>
+            <a:r>
+              <a:rPr lang="en-US" altLang="zh-CN" sz="2000" dirty="0" smtClean="0">
+                <a:solidFill>
+                  <a:schemeClr val="accent1">
+                    <a:lumMod val="50000"/>
+                  </a:schemeClr>
+                </a:solidFill>
+                <a:latin typeface="Abadi MT Condensed Extra Bold" charset="0"/>
+                <a:ea typeface="Abadi MT Condensed Extra Bold" charset="0"/>
+                <a:cs typeface="Abadi MT Condensed Extra Bold" charset="0"/>
+              </a:rPr>
+              <a:t>for</a:t>
+            </a:r>
+            <a:r>
+              <a:rPr lang="zh-CN" altLang="en-US" sz="2000" dirty="0" smtClean="0">
+                <a:solidFill>
+                  <a:schemeClr val="accent1">
+                    <a:lumMod val="50000"/>
+                  </a:schemeClr>
+                </a:solidFill>
+                <a:latin typeface="Abadi MT Condensed Extra Bold" charset="0"/>
+                <a:ea typeface="Abadi MT Condensed Extra Bold" charset="0"/>
+                <a:cs typeface="Abadi MT Condensed Extra Bold" charset="0"/>
+              </a:rPr>
+              <a:t> </a:t>
+            </a:r>
+            <a:r>
+              <a:rPr lang="en-US" altLang="zh-CN" sz="2000" dirty="0" smtClean="0">
+                <a:solidFill>
+                  <a:schemeClr val="accent1">
+                    <a:lumMod val="50000"/>
+                  </a:schemeClr>
+                </a:solidFill>
+                <a:latin typeface="Abadi MT Condensed Extra Bold" charset="0"/>
+                <a:ea typeface="Abadi MT Condensed Extra Bold" charset="0"/>
+                <a:cs typeface="Abadi MT Condensed Extra Bold" charset="0"/>
+              </a:rPr>
+              <a:t>each</a:t>
+            </a:r>
+            <a:r>
+              <a:rPr lang="zh-CN" altLang="en-US" sz="2000" dirty="0" smtClean="0">
+                <a:solidFill>
+                  <a:schemeClr val="accent1">
+                    <a:lumMod val="50000"/>
+                  </a:schemeClr>
+                </a:solidFill>
+                <a:latin typeface="Abadi MT Condensed Extra Bold" charset="0"/>
+                <a:ea typeface="Abadi MT Condensed Extra Bold" charset="0"/>
+                <a:cs typeface="Abadi MT Condensed Extra Bold" charset="0"/>
+              </a:rPr>
+              <a:t> </a:t>
+            </a:r>
+            <a:r>
+              <a:rPr lang="en-US" altLang="zh-CN" sz="2000" dirty="0" smtClean="0">
+                <a:solidFill>
+                  <a:schemeClr val="accent1">
+                    <a:lumMod val="50000"/>
+                  </a:schemeClr>
+                </a:solidFill>
+                <a:latin typeface="Abadi MT Condensed Extra Bold" charset="0"/>
+                <a:ea typeface="Abadi MT Condensed Extra Bold" charset="0"/>
+                <a:cs typeface="Abadi MT Condensed Extra Bold" charset="0"/>
+              </a:rPr>
+              <a:t>city</a:t>
             </a:r>
             <a:r>
               <a:rPr lang="zh-CN" altLang="en-US" sz="2000" dirty="0" smtClean="0">
@@ -6554,7 +6784,7 @@
         <p:spPr>
           <a:xfrm>
             <a:off x="863918" y="1792929"/>
-            <a:ext cx="8125366" cy="4001095"/>
+            <a:ext cx="8125366" cy="4493538"/>
           </a:xfrm>
           <a:prstGeom prst="rect">
             <a:avLst/>
@@ -7111,7 +7341,7 @@
                 <a:ea typeface="Abadi MT Condensed Extra Bold" charset="0"/>
                 <a:cs typeface="Abadi MT Condensed Extra Bold" charset="0"/>
               </a:rPr>
-              <a:t>Boston</a:t>
+              <a:t>City</a:t>
             </a:r>
             <a:r>
               <a:rPr lang="zh-CN" altLang="en-US" sz="1600" dirty="0" smtClean="0">
@@ -7333,499 +7563,213 @@
             </a:endParaRPr>
           </a:p>
           <a:p>
-            <a:pPr marL="800100" lvl="1" indent="-342900">
+            <a:pPr marL="1257300" lvl="2" indent="-342900">
               <a:buFont typeface="Arial" charset="0"/>
               <a:buChar char="•"/>
             </a:pPr>
             <a:r>
-              <a:rPr lang="en-US" altLang="zh-CN" sz="1600" dirty="0" smtClean="0">
-                <a:solidFill>
-                  <a:schemeClr val="accent1">
-                    <a:lumMod val="50000"/>
-                  </a:schemeClr>
-                </a:solidFill>
-                <a:latin typeface="Abadi MT Condensed Extra Bold" charset="0"/>
-                <a:ea typeface="Abadi MT Condensed Extra Bold" charset="0"/>
-                <a:cs typeface="Abadi MT Condensed Extra Bold" charset="0"/>
-              </a:rPr>
-              <a:t>Draw</a:t>
-            </a:r>
-            <a:r>
-              <a:rPr lang="zh-CN" altLang="en-US" sz="1600" dirty="0" smtClean="0">
-                <a:solidFill>
-                  <a:schemeClr val="accent1">
-                    <a:lumMod val="50000"/>
-                  </a:schemeClr>
-                </a:solidFill>
-                <a:latin typeface="Abadi MT Condensed Extra Bold" charset="0"/>
-                <a:ea typeface="Abadi MT Condensed Extra Bold" charset="0"/>
-                <a:cs typeface="Abadi MT Condensed Extra Bold" charset="0"/>
-              </a:rPr>
-              <a:t> </a:t>
-            </a:r>
-            <a:r>
-              <a:rPr lang="en-US" altLang="zh-CN" sz="1600" dirty="0" smtClean="0">
-                <a:solidFill>
-                  <a:schemeClr val="accent1">
-                    <a:lumMod val="50000"/>
-                  </a:schemeClr>
-                </a:solidFill>
-                <a:latin typeface="Abadi MT Condensed Extra Bold" charset="0"/>
-                <a:ea typeface="Abadi MT Condensed Extra Bold" charset="0"/>
-                <a:cs typeface="Abadi MT Condensed Extra Bold" charset="0"/>
-              </a:rPr>
-              <a:t>points</a:t>
-            </a:r>
-            <a:r>
-              <a:rPr lang="zh-CN" altLang="en-US" sz="1600" dirty="0" smtClean="0">
-                <a:solidFill>
-                  <a:schemeClr val="accent1">
-                    <a:lumMod val="50000"/>
-                  </a:schemeClr>
-                </a:solidFill>
-                <a:latin typeface="Abadi MT Condensed Extra Bold" charset="0"/>
-                <a:ea typeface="Abadi MT Condensed Extra Bold" charset="0"/>
-                <a:cs typeface="Abadi MT Condensed Extra Bold" charset="0"/>
-              </a:rPr>
-              <a:t> </a:t>
-            </a:r>
-            <a:r>
-              <a:rPr lang="en-US" altLang="zh-CN" sz="1600" dirty="0" smtClean="0">
-                <a:solidFill>
-                  <a:schemeClr val="accent1">
-                    <a:lumMod val="50000"/>
-                  </a:schemeClr>
-                </a:solidFill>
-                <a:latin typeface="Abadi MT Condensed Extra Bold" charset="0"/>
-                <a:ea typeface="Abadi MT Condensed Extra Bold" charset="0"/>
-                <a:cs typeface="Abadi MT Condensed Extra Bold" charset="0"/>
-              </a:rPr>
-              <a:t>of</a:t>
-            </a:r>
-            <a:r>
-              <a:rPr lang="zh-CN" altLang="en-US" sz="1600" dirty="0" smtClean="0">
-                <a:solidFill>
-                  <a:schemeClr val="accent1">
-                    <a:lumMod val="50000"/>
-                  </a:schemeClr>
-                </a:solidFill>
-                <a:latin typeface="Abadi MT Condensed Extra Bold" charset="0"/>
-                <a:ea typeface="Abadi MT Condensed Extra Bold" charset="0"/>
-                <a:cs typeface="Abadi MT Condensed Extra Bold" charset="0"/>
-              </a:rPr>
-              <a:t> </a:t>
-            </a:r>
-            <a:r>
-              <a:rPr lang="en-US" altLang="zh-CN" sz="1600" dirty="0" smtClean="0">
-                <a:solidFill>
-                  <a:schemeClr val="accent1">
-                    <a:lumMod val="50000"/>
-                  </a:schemeClr>
-                </a:solidFill>
-                <a:latin typeface="Abadi MT Condensed Extra Bold" charset="0"/>
-                <a:ea typeface="Abadi MT Condensed Extra Bold" charset="0"/>
-                <a:cs typeface="Abadi MT Condensed Extra Bold" charset="0"/>
-              </a:rPr>
-              <a:t>different</a:t>
-            </a:r>
-            <a:r>
-              <a:rPr lang="zh-CN" altLang="en-US" sz="1600" dirty="0" smtClean="0">
-                <a:solidFill>
-                  <a:schemeClr val="accent1">
-                    <a:lumMod val="50000"/>
-                  </a:schemeClr>
-                </a:solidFill>
-                <a:latin typeface="Abadi MT Condensed Extra Bold" charset="0"/>
-                <a:ea typeface="Abadi MT Condensed Extra Bold" charset="0"/>
-                <a:cs typeface="Abadi MT Condensed Extra Bold" charset="0"/>
-              </a:rPr>
-              <a:t> </a:t>
-            </a:r>
-            <a:r>
-              <a:rPr lang="en-US" altLang="zh-CN" sz="1600" dirty="0" smtClean="0">
-                <a:solidFill>
-                  <a:schemeClr val="accent1">
-                    <a:lumMod val="50000"/>
-                  </a:schemeClr>
-                </a:solidFill>
-                <a:latin typeface="Abadi MT Condensed Extra Bold" charset="0"/>
-                <a:ea typeface="Abadi MT Condensed Extra Bold" charset="0"/>
-                <a:cs typeface="Abadi MT Condensed Extra Bold" charset="0"/>
-              </a:rPr>
-              <a:t>districts</a:t>
-            </a:r>
-            <a:r>
-              <a:rPr lang="zh-CN" altLang="en-US" sz="1600" dirty="0" smtClean="0">
-                <a:solidFill>
-                  <a:schemeClr val="accent1">
-                    <a:lumMod val="50000"/>
-                  </a:schemeClr>
-                </a:solidFill>
-                <a:latin typeface="Abadi MT Condensed Extra Bold" charset="0"/>
-                <a:ea typeface="Abadi MT Condensed Extra Bold" charset="0"/>
-                <a:cs typeface="Abadi MT Condensed Extra Bold" charset="0"/>
-              </a:rPr>
-              <a:t> </a:t>
-            </a:r>
-            <a:r>
-              <a:rPr lang="en-US" altLang="zh-CN" sz="1600" dirty="0" smtClean="0">
-                <a:solidFill>
-                  <a:schemeClr val="accent1">
-                    <a:lumMod val="50000"/>
-                  </a:schemeClr>
-                </a:solidFill>
-                <a:latin typeface="Abadi MT Condensed Extra Bold" charset="0"/>
-                <a:ea typeface="Abadi MT Condensed Extra Bold" charset="0"/>
-                <a:cs typeface="Abadi MT Condensed Extra Bold" charset="0"/>
-              </a:rPr>
-              <a:t>on</a:t>
-            </a:r>
-            <a:r>
-              <a:rPr lang="zh-CN" altLang="en-US" sz="1600" dirty="0" smtClean="0">
-                <a:solidFill>
-                  <a:schemeClr val="accent1">
-                    <a:lumMod val="50000"/>
-                  </a:schemeClr>
-                </a:solidFill>
-                <a:latin typeface="Abadi MT Condensed Extra Bold" charset="0"/>
-                <a:ea typeface="Abadi MT Condensed Extra Bold" charset="0"/>
-                <a:cs typeface="Abadi MT Condensed Extra Bold" charset="0"/>
-              </a:rPr>
-              <a:t> </a:t>
-            </a:r>
-            <a:r>
-              <a:rPr lang="en-US" altLang="zh-CN" sz="1600" dirty="0" smtClean="0">
-                <a:solidFill>
-                  <a:schemeClr val="accent1">
-                    <a:lumMod val="50000"/>
-                  </a:schemeClr>
-                </a:solidFill>
-                <a:latin typeface="Abadi MT Condensed Extra Bold" charset="0"/>
-                <a:ea typeface="Abadi MT Condensed Extra Bold" charset="0"/>
-                <a:cs typeface="Abadi MT Condensed Extra Bold" charset="0"/>
-              </a:rPr>
-              <a:t>the</a:t>
-            </a:r>
-            <a:r>
-              <a:rPr lang="zh-CN" altLang="en-US" sz="1600" dirty="0" smtClean="0">
-                <a:solidFill>
-                  <a:schemeClr val="accent1">
-                    <a:lumMod val="50000"/>
-                  </a:schemeClr>
-                </a:solidFill>
-                <a:latin typeface="Abadi MT Condensed Extra Bold" charset="0"/>
-                <a:ea typeface="Abadi MT Condensed Extra Bold" charset="0"/>
-                <a:cs typeface="Abadi MT Condensed Extra Bold" charset="0"/>
-              </a:rPr>
-              <a:t> </a:t>
-            </a:r>
-            <a:r>
-              <a:rPr lang="en-US" altLang="zh-CN" sz="1600" dirty="0" smtClean="0">
-                <a:solidFill>
-                  <a:schemeClr val="accent1">
-                    <a:lumMod val="50000"/>
-                  </a:schemeClr>
-                </a:solidFill>
-                <a:latin typeface="Abadi MT Condensed Extra Bold" charset="0"/>
-                <a:ea typeface="Abadi MT Condensed Extra Bold" charset="0"/>
-                <a:cs typeface="Abadi MT Condensed Extra Bold" charset="0"/>
-              </a:rPr>
-              <a:t>map</a:t>
-            </a:r>
-            <a:r>
-              <a:rPr lang="zh-CN" altLang="en-US" sz="1600" dirty="0" smtClean="0">
-                <a:solidFill>
-                  <a:schemeClr val="accent1">
-                    <a:lumMod val="50000"/>
-                  </a:schemeClr>
-                </a:solidFill>
-                <a:latin typeface="Abadi MT Condensed Extra Bold" charset="0"/>
-                <a:ea typeface="Abadi MT Condensed Extra Bold" charset="0"/>
-                <a:cs typeface="Abadi MT Condensed Extra Bold" charset="0"/>
-              </a:rPr>
-              <a:t> </a:t>
-            </a:r>
-            <a:r>
-              <a:rPr lang="en-US" altLang="zh-CN" sz="1600" dirty="0" smtClean="0">
-                <a:solidFill>
-                  <a:schemeClr val="accent1">
-                    <a:lumMod val="50000"/>
-                  </a:schemeClr>
-                </a:solidFill>
-                <a:latin typeface="Abadi MT Condensed Extra Bold" charset="0"/>
-                <a:ea typeface="Abadi MT Condensed Extra Bold" charset="0"/>
-                <a:cs typeface="Abadi MT Condensed Extra Bold" charset="0"/>
-              </a:rPr>
-              <a:t>-&gt;</a:t>
-            </a:r>
-            <a:r>
-              <a:rPr lang="zh-CN" altLang="en-US" sz="1600" dirty="0" smtClean="0">
-                <a:solidFill>
-                  <a:schemeClr val="accent1">
-                    <a:lumMod val="50000"/>
-                  </a:schemeClr>
-                </a:solidFill>
-                <a:latin typeface="Abadi MT Condensed Extra Bold" charset="0"/>
-                <a:ea typeface="Abadi MT Condensed Extra Bold" charset="0"/>
-                <a:cs typeface="Abadi MT Condensed Extra Bold" charset="0"/>
-              </a:rPr>
-              <a:t> </a:t>
-            </a:r>
-            <a:r>
-              <a:rPr lang="en-US" altLang="zh-CN" sz="1600" dirty="0" smtClean="0">
-                <a:solidFill>
-                  <a:schemeClr val="accent1">
-                    <a:lumMod val="50000"/>
-                  </a:schemeClr>
-                </a:solidFill>
-                <a:latin typeface="Abadi MT Condensed Extra Bold" charset="0"/>
-                <a:ea typeface="Abadi MT Condensed Extra Bold" charset="0"/>
-                <a:cs typeface="Abadi MT Condensed Extra Bold" charset="0"/>
-              </a:rPr>
-              <a:t>longitude,</a:t>
-            </a:r>
-            <a:r>
-              <a:rPr lang="zh-CN" altLang="en-US" sz="1600" dirty="0" smtClean="0">
-                <a:solidFill>
-                  <a:schemeClr val="accent1">
-                    <a:lumMod val="50000"/>
-                  </a:schemeClr>
-                </a:solidFill>
-                <a:latin typeface="Abadi MT Condensed Extra Bold" charset="0"/>
-                <a:ea typeface="Abadi MT Condensed Extra Bold" charset="0"/>
-                <a:cs typeface="Abadi MT Condensed Extra Bold" charset="0"/>
-              </a:rPr>
-              <a:t> </a:t>
-            </a:r>
-            <a:r>
-              <a:rPr lang="en-US" altLang="zh-CN" sz="1600" dirty="0" smtClean="0">
-                <a:solidFill>
-                  <a:schemeClr val="accent1">
-                    <a:lumMod val="50000"/>
-                  </a:schemeClr>
-                </a:solidFill>
-                <a:latin typeface="Abadi MT Condensed Extra Bold" charset="0"/>
-                <a:ea typeface="Abadi MT Condensed Extra Bold" charset="0"/>
-                <a:cs typeface="Abadi MT Condensed Extra Bold" charset="0"/>
-              </a:rPr>
-              <a:t>latitude</a:t>
-            </a:r>
-            <a:r>
-              <a:rPr lang="zh-CN" altLang="en-US" sz="1600" dirty="0" smtClean="0">
-                <a:solidFill>
-                  <a:schemeClr val="accent1">
-                    <a:lumMod val="50000"/>
-                  </a:schemeClr>
-                </a:solidFill>
-                <a:latin typeface="Abadi MT Condensed Extra Bold" charset="0"/>
-                <a:ea typeface="Abadi MT Condensed Extra Bold" charset="0"/>
-                <a:cs typeface="Abadi MT Condensed Extra Bold" charset="0"/>
-              </a:rPr>
-              <a:t> </a:t>
-            </a:r>
-            <a:r>
-              <a:rPr lang="en-US" altLang="zh-CN" sz="1600" dirty="0" smtClean="0">
-                <a:solidFill>
-                  <a:schemeClr val="accent1">
-                    <a:lumMod val="50000"/>
-                  </a:schemeClr>
-                </a:solidFill>
-                <a:latin typeface="Abadi MT Condensed Extra Bold" charset="0"/>
-                <a:ea typeface="Abadi MT Condensed Extra Bold" charset="0"/>
-                <a:cs typeface="Abadi MT Condensed Extra Bold" charset="0"/>
-              </a:rPr>
-              <a:t>data</a:t>
-            </a:r>
-            <a:r>
-              <a:rPr lang="zh-CN" altLang="en-US" sz="1600" dirty="0" smtClean="0">
-                <a:solidFill>
-                  <a:schemeClr val="accent1">
-                    <a:lumMod val="50000"/>
-                  </a:schemeClr>
-                </a:solidFill>
-                <a:latin typeface="Abadi MT Condensed Extra Bold" charset="0"/>
-                <a:ea typeface="Abadi MT Condensed Extra Bold" charset="0"/>
-                <a:cs typeface="Abadi MT Condensed Extra Bold" charset="0"/>
-              </a:rPr>
-              <a:t> </a:t>
-            </a:r>
-            <a:r>
-              <a:rPr lang="en-US" altLang="zh-CN" sz="1600" dirty="0" smtClean="0">
-                <a:solidFill>
-                  <a:schemeClr val="accent1">
-                    <a:lumMod val="50000"/>
-                  </a:schemeClr>
-                </a:solidFill>
-                <a:latin typeface="Abadi MT Condensed Extra Bold" charset="0"/>
-                <a:ea typeface="Abadi MT Condensed Extra Bold" charset="0"/>
-                <a:cs typeface="Abadi MT Condensed Extra Bold" charset="0"/>
-              </a:rPr>
-              <a:t>for</a:t>
-            </a:r>
-            <a:r>
-              <a:rPr lang="zh-CN" altLang="en-US" sz="1600" dirty="0" smtClean="0">
-                <a:solidFill>
-                  <a:schemeClr val="accent1">
-                    <a:lumMod val="50000"/>
-                  </a:schemeClr>
-                </a:solidFill>
-                <a:latin typeface="Abadi MT Condensed Extra Bold" charset="0"/>
-                <a:ea typeface="Abadi MT Condensed Extra Bold" charset="0"/>
-                <a:cs typeface="Abadi MT Condensed Extra Bold" charset="0"/>
-              </a:rPr>
-              <a:t> </a:t>
-            </a:r>
-            <a:r>
-              <a:rPr lang="en-US" altLang="zh-CN" sz="1600" dirty="0" smtClean="0">
-                <a:solidFill>
-                  <a:schemeClr val="accent1">
-                    <a:lumMod val="50000"/>
-                  </a:schemeClr>
-                </a:solidFill>
-                <a:latin typeface="Abadi MT Condensed Extra Bold" charset="0"/>
-                <a:ea typeface="Abadi MT Condensed Extra Bold" charset="0"/>
-                <a:cs typeface="Abadi MT Condensed Extra Bold" charset="0"/>
-              </a:rPr>
-              <a:t>these</a:t>
-            </a:r>
-            <a:r>
-              <a:rPr lang="zh-CN" altLang="en-US" sz="1600" dirty="0" smtClean="0">
-                <a:solidFill>
-                  <a:schemeClr val="accent1">
-                    <a:lumMod val="50000"/>
-                  </a:schemeClr>
-                </a:solidFill>
-                <a:latin typeface="Abadi MT Condensed Extra Bold" charset="0"/>
-                <a:ea typeface="Abadi MT Condensed Extra Bold" charset="0"/>
-                <a:cs typeface="Abadi MT Condensed Extra Bold" charset="0"/>
-              </a:rPr>
-              <a:t> </a:t>
-            </a:r>
-            <a:r>
-              <a:rPr lang="en-US" altLang="zh-CN" sz="1600" dirty="0" smtClean="0">
-                <a:solidFill>
-                  <a:schemeClr val="accent1">
-                    <a:lumMod val="50000"/>
-                  </a:schemeClr>
-                </a:solidFill>
-                <a:latin typeface="Abadi MT Condensed Extra Bold" charset="0"/>
-                <a:ea typeface="Abadi MT Condensed Extra Bold" charset="0"/>
-                <a:cs typeface="Abadi MT Condensed Extra Bold" charset="0"/>
-              </a:rPr>
-              <a:t>points</a:t>
-            </a:r>
-          </a:p>
-          <a:p>
-            <a:pPr marL="800100" lvl="1" indent="-342900">
+              <a:rPr lang="en-US" altLang="zh-CN" sz="1600" dirty="0">
+                <a:solidFill>
+                  <a:schemeClr val="accent1">
+                    <a:lumMod val="50000"/>
+                  </a:schemeClr>
+                </a:solidFill>
+                <a:latin typeface="Abadi MT Condensed Extra Bold" charset="0"/>
+                <a:ea typeface="Abadi MT Condensed Extra Bold" charset="0"/>
+                <a:cs typeface="Abadi MT Condensed Extra Bold" charset="0"/>
+              </a:rPr>
+              <a:t>Click</a:t>
+            </a:r>
+            <a:r>
+              <a:rPr lang="zh-CN" altLang="en-US" sz="1600" dirty="0">
+                <a:solidFill>
+                  <a:schemeClr val="accent1">
+                    <a:lumMod val="50000"/>
+                  </a:schemeClr>
+                </a:solidFill>
+                <a:latin typeface="Abadi MT Condensed Extra Bold" charset="0"/>
+                <a:ea typeface="Abadi MT Condensed Extra Bold" charset="0"/>
+                <a:cs typeface="Abadi MT Condensed Extra Bold" charset="0"/>
+              </a:rPr>
+              <a:t> </a:t>
+            </a:r>
+            <a:r>
+              <a:rPr lang="en-US" altLang="zh-CN" sz="1600" dirty="0">
+                <a:solidFill>
+                  <a:schemeClr val="accent1">
+                    <a:lumMod val="50000"/>
+                  </a:schemeClr>
+                </a:solidFill>
+                <a:latin typeface="Abadi MT Condensed Extra Bold" charset="0"/>
+                <a:ea typeface="Abadi MT Condensed Extra Bold" charset="0"/>
+                <a:cs typeface="Abadi MT Condensed Extra Bold" charset="0"/>
+              </a:rPr>
+              <a:t>function</a:t>
+            </a:r>
+            <a:r>
+              <a:rPr lang="zh-CN" altLang="en-US" sz="1600" dirty="0">
+                <a:solidFill>
+                  <a:schemeClr val="accent1">
+                    <a:lumMod val="50000"/>
+                  </a:schemeClr>
+                </a:solidFill>
+                <a:latin typeface="Abadi MT Condensed Extra Bold" charset="0"/>
+                <a:ea typeface="Abadi MT Condensed Extra Bold" charset="0"/>
+                <a:cs typeface="Abadi MT Condensed Extra Bold" charset="0"/>
+              </a:rPr>
+              <a:t> </a:t>
+            </a:r>
+            <a:r>
+              <a:rPr lang="en-US" altLang="zh-CN" sz="1600" dirty="0">
+                <a:solidFill>
+                  <a:schemeClr val="accent1">
+                    <a:lumMod val="50000"/>
+                  </a:schemeClr>
+                </a:solidFill>
+                <a:latin typeface="Abadi MT Condensed Extra Bold" charset="0"/>
+                <a:ea typeface="Abadi MT Condensed Extra Bold" charset="0"/>
+                <a:cs typeface="Abadi MT Condensed Extra Bold" charset="0"/>
+              </a:rPr>
+              <a:t>to</a:t>
+            </a:r>
+            <a:r>
+              <a:rPr lang="zh-CN" altLang="en-US" sz="1600" dirty="0">
+                <a:solidFill>
+                  <a:schemeClr val="accent1">
+                    <a:lumMod val="50000"/>
+                  </a:schemeClr>
+                </a:solidFill>
+                <a:latin typeface="Abadi MT Condensed Extra Bold" charset="0"/>
+                <a:ea typeface="Abadi MT Condensed Extra Bold" charset="0"/>
+                <a:cs typeface="Abadi MT Condensed Extra Bold" charset="0"/>
+              </a:rPr>
+              <a:t> </a:t>
+            </a:r>
+            <a:r>
+              <a:rPr lang="en-US" altLang="zh-CN" sz="1600" dirty="0">
+                <a:solidFill>
+                  <a:schemeClr val="accent1">
+                    <a:lumMod val="50000"/>
+                  </a:schemeClr>
+                </a:solidFill>
+                <a:latin typeface="Abadi MT Condensed Extra Bold" charset="0"/>
+                <a:ea typeface="Abadi MT Condensed Extra Bold" charset="0"/>
+                <a:cs typeface="Abadi MT Condensed Extra Bold" charset="0"/>
+              </a:rPr>
+              <a:t>Zoom</a:t>
+            </a:r>
+            <a:r>
+              <a:rPr lang="zh-CN" altLang="en-US" sz="1600" dirty="0">
+                <a:solidFill>
+                  <a:schemeClr val="accent1">
+                    <a:lumMod val="50000"/>
+                  </a:schemeClr>
+                </a:solidFill>
+                <a:latin typeface="Abadi MT Condensed Extra Bold" charset="0"/>
+                <a:ea typeface="Abadi MT Condensed Extra Bold" charset="0"/>
+                <a:cs typeface="Abadi MT Condensed Extra Bold" charset="0"/>
+              </a:rPr>
+              <a:t> </a:t>
+            </a:r>
+            <a:r>
+              <a:rPr lang="en-US" altLang="zh-CN" sz="1600" dirty="0">
+                <a:solidFill>
+                  <a:schemeClr val="accent1">
+                    <a:lumMod val="50000"/>
+                  </a:schemeClr>
+                </a:solidFill>
+                <a:latin typeface="Abadi MT Condensed Extra Bold" charset="0"/>
+                <a:ea typeface="Abadi MT Condensed Extra Bold" charset="0"/>
+                <a:cs typeface="Abadi MT Condensed Extra Bold" charset="0"/>
+              </a:rPr>
+              <a:t>in</a:t>
+            </a:r>
+          </a:p>
+          <a:p>
+            <a:pPr marL="1257300" lvl="2" indent="-342900">
               <a:buFont typeface="Arial" charset="0"/>
               <a:buChar char="•"/>
             </a:pPr>
             <a:r>
-              <a:rPr lang="en-US" altLang="zh-CN" sz="1600" dirty="0" smtClean="0">
-                <a:solidFill>
-                  <a:schemeClr val="accent1">
-                    <a:lumMod val="50000"/>
-                  </a:schemeClr>
-                </a:solidFill>
-                <a:latin typeface="Abadi MT Condensed Extra Bold" charset="0"/>
-                <a:ea typeface="Abadi MT Condensed Extra Bold" charset="0"/>
-                <a:cs typeface="Abadi MT Condensed Extra Bold" charset="0"/>
-              </a:rPr>
-              <a:t>Axon</a:t>
-            </a:r>
-            <a:r>
-              <a:rPr lang="zh-CN" altLang="en-US" sz="1600" dirty="0" smtClean="0">
-                <a:solidFill>
-                  <a:schemeClr val="accent1">
-                    <a:lumMod val="50000"/>
-                  </a:schemeClr>
-                </a:solidFill>
-                <a:latin typeface="Abadi MT Condensed Extra Bold" charset="0"/>
-                <a:ea typeface="Abadi MT Condensed Extra Bold" charset="0"/>
-                <a:cs typeface="Abadi MT Condensed Extra Bold" charset="0"/>
-              </a:rPr>
-              <a:t> </a:t>
-            </a:r>
-            <a:r>
-              <a:rPr lang="en-US" altLang="zh-CN" sz="1600" dirty="0" smtClean="0">
-                <a:solidFill>
-                  <a:schemeClr val="accent1">
-                    <a:lumMod val="50000"/>
-                  </a:schemeClr>
-                </a:solidFill>
-                <a:latin typeface="Abadi MT Condensed Extra Bold" charset="0"/>
-                <a:ea typeface="Abadi MT Condensed Extra Bold" charset="0"/>
-                <a:cs typeface="Abadi MT Condensed Extra Bold" charset="0"/>
-              </a:rPr>
-              <a:t>drawings</a:t>
-            </a:r>
-            <a:r>
-              <a:rPr lang="zh-CN" altLang="en-US" sz="1600" dirty="0" smtClean="0">
-                <a:solidFill>
-                  <a:schemeClr val="accent1">
-                    <a:lumMod val="50000"/>
-                  </a:schemeClr>
-                </a:solidFill>
-                <a:latin typeface="Abadi MT Condensed Extra Bold" charset="0"/>
-                <a:ea typeface="Abadi MT Condensed Extra Bold" charset="0"/>
-                <a:cs typeface="Abadi MT Condensed Extra Bold" charset="0"/>
-              </a:rPr>
-              <a:t> </a:t>
-            </a:r>
-            <a:r>
-              <a:rPr lang="en-US" altLang="zh-CN" sz="1600" dirty="0" smtClean="0">
-                <a:solidFill>
-                  <a:schemeClr val="accent1">
-                    <a:lumMod val="50000"/>
-                  </a:schemeClr>
-                </a:solidFill>
-                <a:latin typeface="Abadi MT Condensed Extra Bold" charset="0"/>
-                <a:ea typeface="Abadi MT Condensed Extra Bold" charset="0"/>
-                <a:cs typeface="Abadi MT Condensed Extra Bold" charset="0"/>
-              </a:rPr>
-              <a:t>for</a:t>
-            </a:r>
-            <a:r>
-              <a:rPr lang="zh-CN" altLang="en-US" sz="1600" dirty="0" smtClean="0">
-                <a:solidFill>
-                  <a:schemeClr val="accent1">
-                    <a:lumMod val="50000"/>
-                  </a:schemeClr>
-                </a:solidFill>
-                <a:latin typeface="Abadi MT Condensed Extra Bold" charset="0"/>
-                <a:ea typeface="Abadi MT Condensed Extra Bold" charset="0"/>
-                <a:cs typeface="Abadi MT Condensed Extra Bold" charset="0"/>
-              </a:rPr>
-              <a:t> </a:t>
-            </a:r>
-            <a:r>
-              <a:rPr lang="en-US" altLang="zh-CN" sz="1600" dirty="0" smtClean="0">
-                <a:solidFill>
-                  <a:schemeClr val="accent1">
-                    <a:lumMod val="50000"/>
-                  </a:schemeClr>
-                </a:solidFill>
-                <a:latin typeface="Abadi MT Condensed Extra Bold" charset="0"/>
-                <a:ea typeface="Abadi MT Condensed Extra Bold" charset="0"/>
-                <a:cs typeface="Abadi MT Condensed Extra Bold" charset="0"/>
-              </a:rPr>
-              <a:t>each</a:t>
-            </a:r>
-            <a:r>
-              <a:rPr lang="zh-CN" altLang="en-US" sz="1600" dirty="0" smtClean="0">
-                <a:solidFill>
-                  <a:schemeClr val="accent1">
-                    <a:lumMod val="50000"/>
-                  </a:schemeClr>
-                </a:solidFill>
-                <a:latin typeface="Abadi MT Condensed Extra Bold" charset="0"/>
-                <a:ea typeface="Abadi MT Condensed Extra Bold" charset="0"/>
-                <a:cs typeface="Abadi MT Condensed Extra Bold" charset="0"/>
-              </a:rPr>
-              <a:t> </a:t>
-            </a:r>
-            <a:r>
-              <a:rPr lang="en-US" altLang="zh-CN" sz="1600" dirty="0" smtClean="0">
+              <a:rPr lang="en-US" altLang="zh-CN" sz="1600" dirty="0">
+                <a:solidFill>
+                  <a:schemeClr val="accent1">
+                    <a:lumMod val="50000"/>
+                  </a:schemeClr>
+                </a:solidFill>
+                <a:latin typeface="Abadi MT Condensed Extra Bold" charset="0"/>
+                <a:ea typeface="Abadi MT Condensed Extra Bold" charset="0"/>
+                <a:cs typeface="Abadi MT Condensed Extra Bold" charset="0"/>
+              </a:rPr>
+              <a:t>Tooltip</a:t>
+            </a:r>
+            <a:r>
+              <a:rPr lang="zh-CN" altLang="en-US" sz="1600" dirty="0">
+                <a:solidFill>
+                  <a:schemeClr val="accent1">
+                    <a:lumMod val="50000"/>
+                  </a:schemeClr>
+                </a:solidFill>
+                <a:latin typeface="Abadi MT Condensed Extra Bold" charset="0"/>
+                <a:ea typeface="Abadi MT Condensed Extra Bold" charset="0"/>
+                <a:cs typeface="Abadi MT Condensed Extra Bold" charset="0"/>
+              </a:rPr>
+              <a:t> </a:t>
+            </a:r>
+            <a:r>
+              <a:rPr lang="en-US" altLang="zh-CN" sz="1600" dirty="0">
+                <a:solidFill>
+                  <a:schemeClr val="accent1">
+                    <a:lumMod val="50000"/>
+                  </a:schemeClr>
+                </a:solidFill>
+                <a:latin typeface="Abadi MT Condensed Extra Bold" charset="0"/>
+                <a:ea typeface="Abadi MT Condensed Extra Bold" charset="0"/>
+                <a:cs typeface="Abadi MT Condensed Extra Bold" charset="0"/>
+              </a:rPr>
+              <a:t>to</a:t>
+            </a:r>
+            <a:r>
+              <a:rPr lang="zh-CN" altLang="en-US" sz="1600" dirty="0">
+                <a:solidFill>
+                  <a:schemeClr val="accent1">
+                    <a:lumMod val="50000"/>
+                  </a:schemeClr>
+                </a:solidFill>
+                <a:latin typeface="Abadi MT Condensed Extra Bold" charset="0"/>
+                <a:ea typeface="Abadi MT Condensed Extra Bold" charset="0"/>
+                <a:cs typeface="Abadi MT Condensed Extra Bold" charset="0"/>
+              </a:rPr>
+              <a:t> </a:t>
+            </a:r>
+            <a:r>
+              <a:rPr lang="en-US" altLang="zh-CN" sz="1600" dirty="0">
+                <a:solidFill>
+                  <a:schemeClr val="accent1">
+                    <a:lumMod val="50000"/>
+                  </a:schemeClr>
+                </a:solidFill>
+                <a:latin typeface="Abadi MT Condensed Extra Bold" charset="0"/>
+                <a:ea typeface="Abadi MT Condensed Extra Bold" charset="0"/>
+                <a:cs typeface="Abadi MT Condensed Extra Bold" charset="0"/>
+              </a:rPr>
+              <a:t>show</a:t>
+            </a:r>
+            <a:r>
+              <a:rPr lang="zh-CN" altLang="en-US" sz="1600" dirty="0">
+                <a:solidFill>
+                  <a:schemeClr val="accent1">
+                    <a:lumMod val="50000"/>
+                  </a:schemeClr>
+                </a:solidFill>
+                <a:latin typeface="Abadi MT Condensed Extra Bold" charset="0"/>
+                <a:ea typeface="Abadi MT Condensed Extra Bold" charset="0"/>
+                <a:cs typeface="Abadi MT Condensed Extra Bold" charset="0"/>
+              </a:rPr>
+              <a:t> </a:t>
+            </a:r>
+            <a:r>
+              <a:rPr lang="en-US" altLang="zh-CN" sz="1600" dirty="0">
                 <a:solidFill>
                   <a:schemeClr val="accent1">
                     <a:lumMod val="50000"/>
@@ -7838,59 +7782,59 @@
               <a:t>district</a:t>
             </a:r>
             <a:r>
-              <a:rPr lang="zh-CN" altLang="en-US" sz="1600" dirty="0" smtClean="0">
-                <a:solidFill>
-                  <a:schemeClr val="accent1">
-                    <a:lumMod val="50000"/>
-                  </a:schemeClr>
-                </a:solidFill>
-                <a:latin typeface="Abadi MT Condensed Extra Bold" charset="0"/>
-                <a:ea typeface="Abadi MT Condensed Extra Bold" charset="0"/>
-                <a:cs typeface="Abadi MT Condensed Extra Bold" charset="0"/>
-              </a:rPr>
-              <a:t> </a:t>
-            </a:r>
-            <a:r>
-              <a:rPr lang="en-US" altLang="zh-CN" sz="1600" dirty="0" smtClean="0">
-                <a:solidFill>
-                  <a:schemeClr val="accent1">
-                    <a:lumMod val="50000"/>
-                  </a:schemeClr>
-                </a:solidFill>
-                <a:latin typeface="Abadi MT Condensed Extra Bold" charset="0"/>
-                <a:ea typeface="Abadi MT Condensed Extra Bold" charset="0"/>
-                <a:cs typeface="Abadi MT Condensed Extra Bold" charset="0"/>
-              </a:rPr>
-              <a:t>-&gt;</a:t>
-            </a:r>
-            <a:r>
-              <a:rPr lang="zh-CN" altLang="en-US" sz="1600" dirty="0" smtClean="0">
-                <a:solidFill>
-                  <a:schemeClr val="accent1">
-                    <a:lumMod val="50000"/>
-                  </a:schemeClr>
-                </a:solidFill>
-                <a:latin typeface="Abadi MT Condensed Extra Bold" charset="0"/>
-                <a:ea typeface="Abadi MT Condensed Extra Bold" charset="0"/>
-                <a:cs typeface="Abadi MT Condensed Extra Bold" charset="0"/>
-              </a:rPr>
-              <a:t> </a:t>
-            </a:r>
-            <a:r>
-              <a:rPr lang="en-US" altLang="zh-CN" sz="1600" dirty="0" smtClean="0">
-                <a:solidFill>
-                  <a:schemeClr val="accent1">
-                    <a:lumMod val="50000"/>
-                  </a:schemeClr>
-                </a:solidFill>
-                <a:latin typeface="Abadi MT Condensed Extra Bold" charset="0"/>
-                <a:ea typeface="Abadi MT Condensed Extra Bold" charset="0"/>
-                <a:cs typeface="Abadi MT Condensed Extra Bold" charset="0"/>
-              </a:rPr>
-              <a:t>pattern</a:t>
-            </a:r>
-            <a:r>
-              <a:rPr lang="zh-CN" altLang="en-US" sz="1600" dirty="0" smtClean="0">
+              <a:rPr lang="zh-CN" altLang="en-US" sz="1600" dirty="0">
+                <a:solidFill>
+                  <a:schemeClr val="accent1">
+                    <a:lumMod val="50000"/>
+                  </a:schemeClr>
+                </a:solidFill>
+                <a:latin typeface="Abadi MT Condensed Extra Bold" charset="0"/>
+                <a:ea typeface="Abadi MT Condensed Extra Bold" charset="0"/>
+                <a:cs typeface="Abadi MT Condensed Extra Bold" charset="0"/>
+              </a:rPr>
+              <a:t> </a:t>
+            </a:r>
+            <a:r>
+              <a:rPr lang="en-US" altLang="zh-CN" sz="1600" dirty="0">
+                <a:solidFill>
+                  <a:schemeClr val="accent1">
+                    <a:lumMod val="50000"/>
+                  </a:schemeClr>
+                </a:solidFill>
+                <a:latin typeface="Abadi MT Condensed Extra Bold" charset="0"/>
+                <a:ea typeface="Abadi MT Condensed Extra Bold" charset="0"/>
+                <a:cs typeface="Abadi MT Condensed Extra Bold" charset="0"/>
+              </a:rPr>
+              <a:t>basic</a:t>
+            </a:r>
+            <a:r>
+              <a:rPr lang="zh-CN" altLang="en-US" sz="1600" dirty="0">
+                <a:solidFill>
+                  <a:schemeClr val="accent1">
+                    <a:lumMod val="50000"/>
+                  </a:schemeClr>
+                </a:solidFill>
+                <a:latin typeface="Abadi MT Condensed Extra Bold" charset="0"/>
+                <a:ea typeface="Abadi MT Condensed Extra Bold" charset="0"/>
+                <a:cs typeface="Abadi MT Condensed Extra Bold" charset="0"/>
+              </a:rPr>
+              <a:t> </a:t>
+            </a:r>
+            <a:r>
+              <a:rPr lang="en-US" altLang="zh-CN" sz="1600" dirty="0">
+                <a:solidFill>
+                  <a:schemeClr val="accent1">
+                    <a:lumMod val="50000"/>
+                  </a:schemeClr>
+                </a:solidFill>
+                <a:latin typeface="Abadi MT Condensed Extra Bold" charset="0"/>
+                <a:ea typeface="Abadi MT Condensed Extra Bold" charset="0"/>
+                <a:cs typeface="Abadi MT Condensed Extra Bold" charset="0"/>
+              </a:rPr>
+              <a:t>information</a:t>
+            </a:r>
+            <a:r>
+              <a:rPr lang="zh-CN" altLang="en-US" sz="1600" dirty="0">
                 <a:solidFill>
                   <a:schemeClr val="accent1">
                     <a:lumMod val="50000"/>
@@ -7929,7 +7873,7 @@
                 <a:ea typeface="Abadi MT Condensed Extra Bold" charset="0"/>
                 <a:cs typeface="Abadi MT Condensed Extra Bold" charset="0"/>
               </a:rPr>
-              <a:t>Action</a:t>
+              <a:t>Draw</a:t>
             </a:r>
             <a:r>
               <a:rPr lang="zh-CN" altLang="en-US" sz="1600" dirty="0" smtClean="0">
@@ -7955,7 +7899,7 @@
                 <a:ea typeface="Abadi MT Condensed Extra Bold" charset="0"/>
                 <a:cs typeface="Abadi MT Condensed Extra Bold" charset="0"/>
               </a:rPr>
-              <a:t>dots</a:t>
+              <a:t>points</a:t>
             </a:r>
             <a:r>
               <a:rPr lang="zh-CN" altLang="en-US" sz="1600" dirty="0" smtClean="0">
@@ -7981,6 +7925,266 @@
                 <a:ea typeface="Abadi MT Condensed Extra Bold" charset="0"/>
                 <a:cs typeface="Abadi MT Condensed Extra Bold" charset="0"/>
               </a:rPr>
+              <a:t>of</a:t>
+            </a:r>
+            <a:r>
+              <a:rPr lang="zh-CN" altLang="en-US" sz="1600" dirty="0" smtClean="0">
+                <a:solidFill>
+                  <a:schemeClr val="accent1">
+                    <a:lumMod val="50000"/>
+                  </a:schemeClr>
+                </a:solidFill>
+                <a:latin typeface="Abadi MT Condensed Extra Bold" charset="0"/>
+                <a:ea typeface="Abadi MT Condensed Extra Bold" charset="0"/>
+                <a:cs typeface="Abadi MT Condensed Extra Bold" charset="0"/>
+              </a:rPr>
+              <a:t> </a:t>
+            </a:r>
+            <a:r>
+              <a:rPr lang="en-US" altLang="zh-CN" sz="1600" dirty="0" smtClean="0">
+                <a:solidFill>
+                  <a:schemeClr val="accent1">
+                    <a:lumMod val="50000"/>
+                  </a:schemeClr>
+                </a:solidFill>
+                <a:latin typeface="Abadi MT Condensed Extra Bold" charset="0"/>
+                <a:ea typeface="Abadi MT Condensed Extra Bold" charset="0"/>
+                <a:cs typeface="Abadi MT Condensed Extra Bold" charset="0"/>
+              </a:rPr>
+              <a:t>different</a:t>
+            </a:r>
+            <a:r>
+              <a:rPr lang="zh-CN" altLang="en-US" sz="1600" dirty="0" smtClean="0">
+                <a:solidFill>
+                  <a:schemeClr val="accent1">
+                    <a:lumMod val="50000"/>
+                  </a:schemeClr>
+                </a:solidFill>
+                <a:latin typeface="Abadi MT Condensed Extra Bold" charset="0"/>
+                <a:ea typeface="Abadi MT Condensed Extra Bold" charset="0"/>
+                <a:cs typeface="Abadi MT Condensed Extra Bold" charset="0"/>
+              </a:rPr>
+              <a:t> </a:t>
+            </a:r>
+            <a:r>
+              <a:rPr lang="en-US" altLang="zh-CN" sz="1600" dirty="0" smtClean="0">
+                <a:solidFill>
+                  <a:schemeClr val="accent1">
+                    <a:lumMod val="50000"/>
+                  </a:schemeClr>
+                </a:solidFill>
+                <a:latin typeface="Abadi MT Condensed Extra Bold" charset="0"/>
+                <a:ea typeface="Abadi MT Condensed Extra Bold" charset="0"/>
+                <a:cs typeface="Abadi MT Condensed Extra Bold" charset="0"/>
+              </a:rPr>
+              <a:t>districts</a:t>
+            </a:r>
+            <a:r>
+              <a:rPr lang="zh-CN" altLang="en-US" sz="1600" dirty="0" smtClean="0">
+                <a:solidFill>
+                  <a:schemeClr val="accent1">
+                    <a:lumMod val="50000"/>
+                  </a:schemeClr>
+                </a:solidFill>
+                <a:latin typeface="Abadi MT Condensed Extra Bold" charset="0"/>
+                <a:ea typeface="Abadi MT Condensed Extra Bold" charset="0"/>
+                <a:cs typeface="Abadi MT Condensed Extra Bold" charset="0"/>
+              </a:rPr>
+              <a:t> </a:t>
+            </a:r>
+            <a:r>
+              <a:rPr lang="en-US" altLang="zh-CN" sz="1600" dirty="0" smtClean="0">
+                <a:solidFill>
+                  <a:schemeClr val="accent1">
+                    <a:lumMod val="50000"/>
+                  </a:schemeClr>
+                </a:solidFill>
+                <a:latin typeface="Abadi MT Condensed Extra Bold" charset="0"/>
+                <a:ea typeface="Abadi MT Condensed Extra Bold" charset="0"/>
+                <a:cs typeface="Abadi MT Condensed Extra Bold" charset="0"/>
+              </a:rPr>
+              <a:t>on</a:t>
+            </a:r>
+            <a:r>
+              <a:rPr lang="zh-CN" altLang="en-US" sz="1600" dirty="0" smtClean="0">
+                <a:solidFill>
+                  <a:schemeClr val="accent1">
+                    <a:lumMod val="50000"/>
+                  </a:schemeClr>
+                </a:solidFill>
+                <a:latin typeface="Abadi MT Condensed Extra Bold" charset="0"/>
+                <a:ea typeface="Abadi MT Condensed Extra Bold" charset="0"/>
+                <a:cs typeface="Abadi MT Condensed Extra Bold" charset="0"/>
+              </a:rPr>
+              <a:t> </a:t>
+            </a:r>
+            <a:r>
+              <a:rPr lang="en-US" altLang="zh-CN" sz="1600" dirty="0" smtClean="0">
+                <a:solidFill>
+                  <a:schemeClr val="accent1">
+                    <a:lumMod val="50000"/>
+                  </a:schemeClr>
+                </a:solidFill>
+                <a:latin typeface="Abadi MT Condensed Extra Bold" charset="0"/>
+                <a:ea typeface="Abadi MT Condensed Extra Bold" charset="0"/>
+                <a:cs typeface="Abadi MT Condensed Extra Bold" charset="0"/>
+              </a:rPr>
+              <a:t>the</a:t>
+            </a:r>
+            <a:r>
+              <a:rPr lang="zh-CN" altLang="en-US" sz="1600" dirty="0" smtClean="0">
+                <a:solidFill>
+                  <a:schemeClr val="accent1">
+                    <a:lumMod val="50000"/>
+                  </a:schemeClr>
+                </a:solidFill>
+                <a:latin typeface="Abadi MT Condensed Extra Bold" charset="0"/>
+                <a:ea typeface="Abadi MT Condensed Extra Bold" charset="0"/>
+                <a:cs typeface="Abadi MT Condensed Extra Bold" charset="0"/>
+              </a:rPr>
+              <a:t> </a:t>
+            </a:r>
+            <a:r>
+              <a:rPr lang="en-US" altLang="zh-CN" sz="1600" dirty="0" smtClean="0">
+                <a:solidFill>
+                  <a:schemeClr val="accent1">
+                    <a:lumMod val="50000"/>
+                  </a:schemeClr>
+                </a:solidFill>
+                <a:latin typeface="Abadi MT Condensed Extra Bold" charset="0"/>
+                <a:ea typeface="Abadi MT Condensed Extra Bold" charset="0"/>
+                <a:cs typeface="Abadi MT Condensed Extra Bold" charset="0"/>
+              </a:rPr>
+              <a:t>map</a:t>
+            </a:r>
+            <a:r>
+              <a:rPr lang="zh-CN" altLang="en-US" sz="1600" dirty="0" smtClean="0">
+                <a:solidFill>
+                  <a:schemeClr val="accent1">
+                    <a:lumMod val="50000"/>
+                  </a:schemeClr>
+                </a:solidFill>
+                <a:latin typeface="Abadi MT Condensed Extra Bold" charset="0"/>
+                <a:ea typeface="Abadi MT Condensed Extra Bold" charset="0"/>
+                <a:cs typeface="Abadi MT Condensed Extra Bold" charset="0"/>
+              </a:rPr>
+              <a:t> </a:t>
+            </a:r>
+            <a:r>
+              <a:rPr lang="en-US" altLang="zh-CN" sz="1600" dirty="0" smtClean="0">
+                <a:solidFill>
+                  <a:schemeClr val="accent1">
+                    <a:lumMod val="50000"/>
+                  </a:schemeClr>
+                </a:solidFill>
+                <a:latin typeface="Abadi MT Condensed Extra Bold" charset="0"/>
+                <a:ea typeface="Abadi MT Condensed Extra Bold" charset="0"/>
+                <a:cs typeface="Abadi MT Condensed Extra Bold" charset="0"/>
+              </a:rPr>
+              <a:t>-&gt;</a:t>
+            </a:r>
+            <a:r>
+              <a:rPr lang="zh-CN" altLang="en-US" sz="1600" dirty="0" smtClean="0">
+                <a:solidFill>
+                  <a:schemeClr val="accent1">
+                    <a:lumMod val="50000"/>
+                  </a:schemeClr>
+                </a:solidFill>
+                <a:latin typeface="Abadi MT Condensed Extra Bold" charset="0"/>
+                <a:ea typeface="Abadi MT Condensed Extra Bold" charset="0"/>
+                <a:cs typeface="Abadi MT Condensed Extra Bold" charset="0"/>
+              </a:rPr>
+              <a:t> </a:t>
+            </a:r>
+            <a:r>
+              <a:rPr lang="en-US" altLang="zh-CN" sz="1600" dirty="0" smtClean="0">
+                <a:solidFill>
+                  <a:schemeClr val="accent1">
+                    <a:lumMod val="50000"/>
+                  </a:schemeClr>
+                </a:solidFill>
+                <a:latin typeface="Abadi MT Condensed Extra Bold" charset="0"/>
+                <a:ea typeface="Abadi MT Condensed Extra Bold" charset="0"/>
+                <a:cs typeface="Abadi MT Condensed Extra Bold" charset="0"/>
+              </a:rPr>
+              <a:t>longitude,</a:t>
+            </a:r>
+            <a:r>
+              <a:rPr lang="zh-CN" altLang="en-US" sz="1600" dirty="0" smtClean="0">
+                <a:solidFill>
+                  <a:schemeClr val="accent1">
+                    <a:lumMod val="50000"/>
+                  </a:schemeClr>
+                </a:solidFill>
+                <a:latin typeface="Abadi MT Condensed Extra Bold" charset="0"/>
+                <a:ea typeface="Abadi MT Condensed Extra Bold" charset="0"/>
+                <a:cs typeface="Abadi MT Condensed Extra Bold" charset="0"/>
+              </a:rPr>
+              <a:t> </a:t>
+            </a:r>
+            <a:r>
+              <a:rPr lang="en-US" altLang="zh-CN" sz="1600" dirty="0" smtClean="0">
+                <a:solidFill>
+                  <a:schemeClr val="accent1">
+                    <a:lumMod val="50000"/>
+                  </a:schemeClr>
+                </a:solidFill>
+                <a:latin typeface="Abadi MT Condensed Extra Bold" charset="0"/>
+                <a:ea typeface="Abadi MT Condensed Extra Bold" charset="0"/>
+                <a:cs typeface="Abadi MT Condensed Extra Bold" charset="0"/>
+              </a:rPr>
+              <a:t>latitude</a:t>
+            </a:r>
+            <a:r>
+              <a:rPr lang="zh-CN" altLang="en-US" sz="1600" dirty="0" smtClean="0">
+                <a:solidFill>
+                  <a:schemeClr val="accent1">
+                    <a:lumMod val="50000"/>
+                  </a:schemeClr>
+                </a:solidFill>
+                <a:latin typeface="Abadi MT Condensed Extra Bold" charset="0"/>
+                <a:ea typeface="Abadi MT Condensed Extra Bold" charset="0"/>
+                <a:cs typeface="Abadi MT Condensed Extra Bold" charset="0"/>
+              </a:rPr>
+              <a:t> </a:t>
+            </a:r>
+            <a:r>
+              <a:rPr lang="en-US" altLang="zh-CN" sz="1600" dirty="0" smtClean="0">
+                <a:solidFill>
+                  <a:schemeClr val="accent1">
+                    <a:lumMod val="50000"/>
+                  </a:schemeClr>
+                </a:solidFill>
+                <a:latin typeface="Abadi MT Condensed Extra Bold" charset="0"/>
+                <a:ea typeface="Abadi MT Condensed Extra Bold" charset="0"/>
+                <a:cs typeface="Abadi MT Condensed Extra Bold" charset="0"/>
+              </a:rPr>
+              <a:t>data</a:t>
+            </a:r>
+            <a:r>
+              <a:rPr lang="zh-CN" altLang="en-US" sz="1600" dirty="0" smtClean="0">
+                <a:solidFill>
+                  <a:schemeClr val="accent1">
+                    <a:lumMod val="50000"/>
+                  </a:schemeClr>
+                </a:solidFill>
+                <a:latin typeface="Abadi MT Condensed Extra Bold" charset="0"/>
+                <a:ea typeface="Abadi MT Condensed Extra Bold" charset="0"/>
+                <a:cs typeface="Abadi MT Condensed Extra Bold" charset="0"/>
+              </a:rPr>
+              <a:t> </a:t>
+            </a:r>
+            <a:r>
+              <a:rPr lang="en-US" altLang="zh-CN" sz="1600" dirty="0" smtClean="0">
+                <a:solidFill>
+                  <a:schemeClr val="accent1">
+                    <a:lumMod val="50000"/>
+                  </a:schemeClr>
+                </a:solidFill>
+                <a:latin typeface="Abadi MT Condensed Extra Bold" charset="0"/>
+                <a:ea typeface="Abadi MT Condensed Extra Bold" charset="0"/>
+                <a:cs typeface="Abadi MT Condensed Extra Bold" charset="0"/>
+              </a:rPr>
               <a:t>for</a:t>
             </a:r>
             <a:r>
@@ -8007,7 +8211,7 @@
                 <a:ea typeface="Abadi MT Condensed Extra Bold" charset="0"/>
                 <a:cs typeface="Abadi MT Condensed Extra Bold" charset="0"/>
               </a:rPr>
-              <a:t>typical</a:t>
+              <a:t>these</a:t>
             </a:r>
             <a:r>
               <a:rPr lang="zh-CN" altLang="en-US" sz="1600" dirty="0" smtClean="0">
@@ -8033,189 +8237,7 @@
                 <a:ea typeface="Abadi MT Condensed Extra Bold" charset="0"/>
                 <a:cs typeface="Abadi MT Condensed Extra Bold" charset="0"/>
               </a:rPr>
-              <a:t>buildings</a:t>
-            </a:r>
-            <a:r>
-              <a:rPr lang="zh-CN" altLang="en-US" sz="1600" dirty="0" smtClean="0">
-                <a:solidFill>
-                  <a:schemeClr val="accent1">
-                    <a:lumMod val="50000"/>
-                  </a:schemeClr>
-                </a:solidFill>
-                <a:latin typeface="Abadi MT Condensed Extra Bold" charset="0"/>
-                <a:ea typeface="Abadi MT Condensed Extra Bold" charset="0"/>
-                <a:cs typeface="Abadi MT Condensed Extra Bold" charset="0"/>
-              </a:rPr>
-              <a:t> </a:t>
-            </a:r>
-            <a:r>
-              <a:rPr lang="en-US" altLang="zh-CN" sz="1600" dirty="0" smtClean="0">
-                <a:solidFill>
-                  <a:schemeClr val="accent1">
-                    <a:lumMod val="50000"/>
-                  </a:schemeClr>
-                </a:solidFill>
-                <a:latin typeface="Abadi MT Condensed Extra Bold" charset="0"/>
-                <a:ea typeface="Abadi MT Condensed Extra Bold" charset="0"/>
-                <a:cs typeface="Abadi MT Condensed Extra Bold" charset="0"/>
-              </a:rPr>
-              <a:t>-&gt;</a:t>
-            </a:r>
-            <a:r>
-              <a:rPr lang="zh-CN" altLang="en-US" sz="1600" dirty="0" smtClean="0">
-                <a:solidFill>
-                  <a:schemeClr val="accent1">
-                    <a:lumMod val="50000"/>
-                  </a:schemeClr>
-                </a:solidFill>
-                <a:latin typeface="Abadi MT Condensed Extra Bold" charset="0"/>
-                <a:ea typeface="Abadi MT Condensed Extra Bold" charset="0"/>
-                <a:cs typeface="Abadi MT Condensed Extra Bold" charset="0"/>
-              </a:rPr>
-              <a:t> </a:t>
-            </a:r>
-            <a:r>
-              <a:rPr lang="en-US" altLang="zh-CN" sz="1600" dirty="0" smtClean="0">
-                <a:solidFill>
-                  <a:schemeClr val="accent1">
-                    <a:lumMod val="50000"/>
-                  </a:schemeClr>
-                </a:solidFill>
-                <a:latin typeface="Abadi MT Condensed Extra Bold" charset="0"/>
-                <a:ea typeface="Abadi MT Condensed Extra Bold" charset="0"/>
-                <a:cs typeface="Abadi MT Condensed Extra Bold" charset="0"/>
-              </a:rPr>
-              <a:t>positions</a:t>
-            </a:r>
-            <a:r>
-              <a:rPr lang="zh-CN" altLang="en-US" sz="1600" dirty="0" smtClean="0">
-                <a:solidFill>
-                  <a:schemeClr val="accent1">
-                    <a:lumMod val="50000"/>
-                  </a:schemeClr>
-                </a:solidFill>
-                <a:latin typeface="Abadi MT Condensed Extra Bold" charset="0"/>
-                <a:ea typeface="Abadi MT Condensed Extra Bold" charset="0"/>
-                <a:cs typeface="Abadi MT Condensed Extra Bold" charset="0"/>
-              </a:rPr>
-              <a:t> </a:t>
-            </a:r>
-            <a:r>
-              <a:rPr lang="en-US" altLang="zh-CN" sz="1600" dirty="0" smtClean="0">
-                <a:solidFill>
-                  <a:schemeClr val="accent1">
-                    <a:lumMod val="50000"/>
-                  </a:schemeClr>
-                </a:solidFill>
-                <a:latin typeface="Abadi MT Condensed Extra Bold" charset="0"/>
-                <a:ea typeface="Abadi MT Condensed Extra Bold" charset="0"/>
-                <a:cs typeface="Abadi MT Condensed Extra Bold" charset="0"/>
-              </a:rPr>
-              <a:t>of</a:t>
-            </a:r>
-            <a:r>
-              <a:rPr lang="zh-CN" altLang="en-US" sz="1600" dirty="0" smtClean="0">
-                <a:solidFill>
-                  <a:schemeClr val="accent1">
-                    <a:lumMod val="50000"/>
-                  </a:schemeClr>
-                </a:solidFill>
-                <a:latin typeface="Abadi MT Condensed Extra Bold" charset="0"/>
-                <a:ea typeface="Abadi MT Condensed Extra Bold" charset="0"/>
-                <a:cs typeface="Abadi MT Condensed Extra Bold" charset="0"/>
-              </a:rPr>
-              <a:t> </a:t>
-            </a:r>
-            <a:r>
-              <a:rPr lang="en-US" altLang="zh-CN" sz="1600" dirty="0" smtClean="0">
-                <a:solidFill>
-                  <a:schemeClr val="accent1">
-                    <a:lumMod val="50000"/>
-                  </a:schemeClr>
-                </a:solidFill>
-                <a:latin typeface="Abadi MT Condensed Extra Bold" charset="0"/>
-                <a:ea typeface="Abadi MT Condensed Extra Bold" charset="0"/>
-                <a:cs typeface="Abadi MT Condensed Extra Bold" charset="0"/>
-              </a:rPr>
-              <a:t>dots</a:t>
-            </a:r>
-            <a:r>
-              <a:rPr lang="zh-CN" altLang="en-US" sz="1600" dirty="0" smtClean="0">
-                <a:solidFill>
-                  <a:schemeClr val="accent1">
-                    <a:lumMod val="50000"/>
-                  </a:schemeClr>
-                </a:solidFill>
-                <a:latin typeface="Abadi MT Condensed Extra Bold" charset="0"/>
-                <a:ea typeface="Abadi MT Condensed Extra Bold" charset="0"/>
-                <a:cs typeface="Abadi MT Condensed Extra Bold" charset="0"/>
-              </a:rPr>
-              <a:t> </a:t>
-            </a:r>
-            <a:r>
-              <a:rPr lang="en-US" altLang="zh-CN" sz="1600" dirty="0" smtClean="0">
-                <a:solidFill>
-                  <a:schemeClr val="accent1">
-                    <a:lumMod val="50000"/>
-                  </a:schemeClr>
-                </a:solidFill>
-                <a:latin typeface="Abadi MT Condensed Extra Bold" charset="0"/>
-                <a:ea typeface="Abadi MT Condensed Extra Bold" charset="0"/>
-                <a:cs typeface="Abadi MT Condensed Extra Bold" charset="0"/>
-              </a:rPr>
-              <a:t>on</a:t>
-            </a:r>
-            <a:r>
-              <a:rPr lang="zh-CN" altLang="en-US" sz="1600" dirty="0" smtClean="0">
-                <a:solidFill>
-                  <a:schemeClr val="accent1">
-                    <a:lumMod val="50000"/>
-                  </a:schemeClr>
-                </a:solidFill>
-                <a:latin typeface="Abadi MT Condensed Extra Bold" charset="0"/>
-                <a:ea typeface="Abadi MT Condensed Extra Bold" charset="0"/>
-                <a:cs typeface="Abadi MT Condensed Extra Bold" charset="0"/>
-              </a:rPr>
-              <a:t> </a:t>
-            </a:r>
-            <a:r>
-              <a:rPr lang="en-US" altLang="zh-CN" sz="1600" dirty="0" smtClean="0">
-                <a:solidFill>
-                  <a:schemeClr val="accent1">
-                    <a:lumMod val="50000"/>
-                  </a:schemeClr>
-                </a:solidFill>
-                <a:latin typeface="Abadi MT Condensed Extra Bold" charset="0"/>
-                <a:ea typeface="Abadi MT Condensed Extra Bold" charset="0"/>
-                <a:cs typeface="Abadi MT Condensed Extra Bold" charset="0"/>
-              </a:rPr>
-              <a:t>the</a:t>
-            </a:r>
-            <a:r>
-              <a:rPr lang="zh-CN" altLang="en-US" sz="1600" dirty="0" smtClean="0">
-                <a:solidFill>
-                  <a:schemeClr val="accent1">
-                    <a:lumMod val="50000"/>
-                  </a:schemeClr>
-                </a:solidFill>
-                <a:latin typeface="Abadi MT Condensed Extra Bold" charset="0"/>
-                <a:ea typeface="Abadi MT Condensed Extra Bold" charset="0"/>
-                <a:cs typeface="Abadi MT Condensed Extra Bold" charset="0"/>
-              </a:rPr>
-              <a:t> </a:t>
-            </a:r>
-            <a:r>
-              <a:rPr lang="en-US" altLang="zh-CN" sz="1600" dirty="0" smtClean="0">
-                <a:solidFill>
-                  <a:schemeClr val="accent1">
-                    <a:lumMod val="50000"/>
-                  </a:schemeClr>
-                </a:solidFill>
-                <a:latin typeface="Abadi MT Condensed Extra Bold" charset="0"/>
-                <a:ea typeface="Abadi MT Condensed Extra Bold" charset="0"/>
-                <a:cs typeface="Abadi MT Condensed Extra Bold" charset="0"/>
-              </a:rPr>
-              <a:t>drawing</a:t>
+              <a:t>points</a:t>
             </a:r>
           </a:p>
           <a:p>
@@ -8234,7 +8256,7 @@
                 <a:ea typeface="Abadi MT Condensed Extra Bold" charset="0"/>
                 <a:cs typeface="Abadi MT Condensed Extra Bold" charset="0"/>
               </a:rPr>
-              <a:t>Mouse</a:t>
+              <a:t>Axon</a:t>
             </a:r>
             <a:r>
               <a:rPr lang="zh-CN" altLang="en-US" sz="1600" dirty="0" smtClean="0">
@@ -8260,7 +8282,7 @@
                 <a:ea typeface="Abadi MT Condensed Extra Bold" charset="0"/>
                 <a:cs typeface="Abadi MT Condensed Extra Bold" charset="0"/>
               </a:rPr>
-              <a:t>events</a:t>
+              <a:t>drawings</a:t>
             </a:r>
             <a:r>
               <a:rPr lang="zh-CN" altLang="en-US" sz="1600" dirty="0" smtClean="0">
@@ -8286,7 +8308,7 @@
                 <a:ea typeface="Abadi MT Condensed Extra Bold" charset="0"/>
                 <a:cs typeface="Abadi MT Condensed Extra Bold" charset="0"/>
               </a:rPr>
-              <a:t>on</a:t>
+              <a:t>for</a:t>
             </a:r>
             <a:r>
               <a:rPr lang="zh-CN" altLang="en-US" sz="1600" dirty="0" smtClean="0">
@@ -8312,7 +8334,7 @@
                 <a:ea typeface="Abadi MT Condensed Extra Bold" charset="0"/>
                 <a:cs typeface="Abadi MT Condensed Extra Bold" charset="0"/>
               </a:rPr>
-              <a:t>dots,</a:t>
+              <a:t>each</a:t>
             </a:r>
             <a:r>
               <a:rPr lang="zh-CN" altLang="en-US" sz="1600" dirty="0" smtClean="0">
@@ -8338,7 +8360,7 @@
                 <a:ea typeface="Abadi MT Condensed Extra Bold" charset="0"/>
                 <a:cs typeface="Abadi MT Condensed Extra Bold" charset="0"/>
               </a:rPr>
-              <a:t>show</a:t>
+              <a:t>district</a:t>
             </a:r>
             <a:r>
               <a:rPr lang="zh-CN" altLang="en-US" sz="1600" dirty="0" smtClean="0">
@@ -8364,7 +8386,7 @@
                 <a:ea typeface="Abadi MT Condensed Extra Bold" charset="0"/>
                 <a:cs typeface="Abadi MT Condensed Extra Bold" charset="0"/>
               </a:rPr>
-              <a:t>information</a:t>
+              <a:t>-&gt;</a:t>
             </a:r>
             <a:r>
               <a:rPr lang="zh-CN" altLang="en-US" sz="1600" dirty="0" smtClean="0">
@@ -8390,85 +8412,7 @@
                 <a:ea typeface="Abadi MT Condensed Extra Bold" charset="0"/>
                 <a:cs typeface="Abadi MT Condensed Extra Bold" charset="0"/>
               </a:rPr>
-              <a:t>of</a:t>
-            </a:r>
-            <a:r>
-              <a:rPr lang="zh-CN" altLang="en-US" sz="1600" dirty="0" smtClean="0">
-                <a:solidFill>
-                  <a:schemeClr val="accent1">
-                    <a:lumMod val="50000"/>
-                  </a:schemeClr>
-                </a:solidFill>
-                <a:latin typeface="Abadi MT Condensed Extra Bold" charset="0"/>
-                <a:ea typeface="Abadi MT Condensed Extra Bold" charset="0"/>
-                <a:cs typeface="Abadi MT Condensed Extra Bold" charset="0"/>
-              </a:rPr>
-              <a:t> </a:t>
-            </a:r>
-            <a:r>
-              <a:rPr lang="en-US" altLang="zh-CN" sz="1600" dirty="0" smtClean="0">
-                <a:solidFill>
-                  <a:schemeClr val="accent1">
-                    <a:lumMod val="50000"/>
-                  </a:schemeClr>
-                </a:solidFill>
-                <a:latin typeface="Abadi MT Condensed Extra Bold" charset="0"/>
-                <a:ea typeface="Abadi MT Condensed Extra Bold" charset="0"/>
-                <a:cs typeface="Abadi MT Condensed Extra Bold" charset="0"/>
-              </a:rPr>
-              <a:t>single</a:t>
-            </a:r>
-            <a:r>
-              <a:rPr lang="zh-CN" altLang="en-US" sz="1600" dirty="0" smtClean="0">
-                <a:solidFill>
-                  <a:schemeClr val="accent1">
-                    <a:lumMod val="50000"/>
-                  </a:schemeClr>
-                </a:solidFill>
-                <a:latin typeface="Abadi MT Condensed Extra Bold" charset="0"/>
-                <a:ea typeface="Abadi MT Condensed Extra Bold" charset="0"/>
-                <a:cs typeface="Abadi MT Condensed Extra Bold" charset="0"/>
-              </a:rPr>
-              <a:t> </a:t>
-            </a:r>
-            <a:r>
-              <a:rPr lang="en-US" altLang="zh-CN" sz="1600" dirty="0" smtClean="0">
-                <a:solidFill>
-                  <a:schemeClr val="accent1">
-                    <a:lumMod val="50000"/>
-                  </a:schemeClr>
-                </a:solidFill>
-                <a:latin typeface="Abadi MT Condensed Extra Bold" charset="0"/>
-                <a:ea typeface="Abadi MT Condensed Extra Bold" charset="0"/>
-                <a:cs typeface="Abadi MT Condensed Extra Bold" charset="0"/>
-              </a:rPr>
-              <a:t>building-&gt;</a:t>
-            </a:r>
-            <a:r>
-              <a:rPr lang="zh-CN" altLang="en-US" sz="1600" dirty="0" smtClean="0">
-                <a:solidFill>
-                  <a:schemeClr val="accent1">
-                    <a:lumMod val="50000"/>
-                  </a:schemeClr>
-                </a:solidFill>
-                <a:latin typeface="Abadi MT Condensed Extra Bold" charset="0"/>
-                <a:ea typeface="Abadi MT Condensed Extra Bold" charset="0"/>
-                <a:cs typeface="Abadi MT Condensed Extra Bold" charset="0"/>
-              </a:rPr>
-              <a:t> </a:t>
-            </a:r>
-            <a:r>
-              <a:rPr lang="en-US" altLang="zh-CN" sz="1600" dirty="0" smtClean="0">
-                <a:solidFill>
-                  <a:schemeClr val="accent1">
-                    <a:lumMod val="50000"/>
-                  </a:schemeClr>
-                </a:solidFill>
-                <a:latin typeface="Abadi MT Condensed Extra Bold" charset="0"/>
-                <a:ea typeface="Abadi MT Condensed Extra Bold" charset="0"/>
-                <a:cs typeface="Abadi MT Condensed Extra Bold" charset="0"/>
-              </a:rPr>
-              <a:t>tooltips</a:t>
+              <a:t>pattern</a:t>
             </a:r>
             <a:r>
               <a:rPr lang="zh-CN" altLang="en-US" sz="1600" dirty="0" smtClean="0">
@@ -8510,7 +8454,7 @@
                 <a:ea typeface="Abadi MT Condensed Extra Bold" charset="0"/>
                 <a:cs typeface="Abadi MT Condensed Extra Bold" charset="0"/>
               </a:rPr>
-              <a:t>Button</a:t>
+              <a:t>Action</a:t>
             </a:r>
             <a:r>
               <a:rPr lang="zh-CN" altLang="en-US" sz="1600" dirty="0" smtClean="0">
@@ -8536,7 +8480,7 @@
                 <a:ea typeface="Abadi MT Condensed Extra Bold" charset="0"/>
                 <a:cs typeface="Abadi MT Condensed Extra Bold" charset="0"/>
               </a:rPr>
-              <a:t>click</a:t>
+              <a:t>dots</a:t>
             </a:r>
             <a:r>
               <a:rPr lang="zh-CN" altLang="en-US" sz="1600" dirty="0" smtClean="0">
@@ -8562,7 +8506,7 @@
                 <a:ea typeface="Abadi MT Condensed Extra Bold" charset="0"/>
                 <a:cs typeface="Abadi MT Condensed Extra Bold" charset="0"/>
               </a:rPr>
-              <a:t>function,</a:t>
+              <a:t>for</a:t>
             </a:r>
             <a:r>
               <a:rPr lang="zh-CN" altLang="en-US" sz="1600" dirty="0" smtClean="0">
@@ -8588,6 +8532,337 @@
                 <a:ea typeface="Abadi MT Condensed Extra Bold" charset="0"/>
                 <a:cs typeface="Abadi MT Condensed Extra Bold" charset="0"/>
               </a:rPr>
+              <a:t>typical</a:t>
+            </a:r>
+            <a:r>
+              <a:rPr lang="zh-CN" altLang="en-US" sz="1600" dirty="0" smtClean="0">
+                <a:solidFill>
+                  <a:schemeClr val="accent1">
+                    <a:lumMod val="50000"/>
+                  </a:schemeClr>
+                </a:solidFill>
+                <a:latin typeface="Abadi MT Condensed Extra Bold" charset="0"/>
+                <a:ea typeface="Abadi MT Condensed Extra Bold" charset="0"/>
+                <a:cs typeface="Abadi MT Condensed Extra Bold" charset="0"/>
+              </a:rPr>
+              <a:t> </a:t>
+            </a:r>
+            <a:r>
+              <a:rPr lang="en-US" altLang="zh-CN" sz="1600" dirty="0" smtClean="0">
+                <a:solidFill>
+                  <a:schemeClr val="accent1">
+                    <a:lumMod val="50000"/>
+                  </a:schemeClr>
+                </a:solidFill>
+                <a:latin typeface="Abadi MT Condensed Extra Bold" charset="0"/>
+                <a:ea typeface="Abadi MT Condensed Extra Bold" charset="0"/>
+                <a:cs typeface="Abadi MT Condensed Extra Bold" charset="0"/>
+              </a:rPr>
+              <a:t>buildings</a:t>
+            </a:r>
+            <a:r>
+              <a:rPr lang="zh-CN" altLang="en-US" sz="1600" dirty="0" smtClean="0">
+                <a:solidFill>
+                  <a:schemeClr val="accent1">
+                    <a:lumMod val="50000"/>
+                  </a:schemeClr>
+                </a:solidFill>
+                <a:latin typeface="Abadi MT Condensed Extra Bold" charset="0"/>
+                <a:ea typeface="Abadi MT Condensed Extra Bold" charset="0"/>
+                <a:cs typeface="Abadi MT Condensed Extra Bold" charset="0"/>
+              </a:rPr>
+              <a:t> </a:t>
+            </a:r>
+            <a:r>
+              <a:rPr lang="en-US" altLang="zh-CN" sz="1600" dirty="0" smtClean="0">
+                <a:solidFill>
+                  <a:schemeClr val="accent1">
+                    <a:lumMod val="50000"/>
+                  </a:schemeClr>
+                </a:solidFill>
+                <a:latin typeface="Abadi MT Condensed Extra Bold" charset="0"/>
+                <a:ea typeface="Abadi MT Condensed Extra Bold" charset="0"/>
+                <a:cs typeface="Abadi MT Condensed Extra Bold" charset="0"/>
+              </a:rPr>
+              <a:t>-&gt;</a:t>
+            </a:r>
+            <a:r>
+              <a:rPr lang="zh-CN" altLang="en-US" sz="1600" dirty="0" smtClean="0">
+                <a:solidFill>
+                  <a:schemeClr val="accent1">
+                    <a:lumMod val="50000"/>
+                  </a:schemeClr>
+                </a:solidFill>
+                <a:latin typeface="Abadi MT Condensed Extra Bold" charset="0"/>
+                <a:ea typeface="Abadi MT Condensed Extra Bold" charset="0"/>
+                <a:cs typeface="Abadi MT Condensed Extra Bold" charset="0"/>
+              </a:rPr>
+              <a:t> </a:t>
+            </a:r>
+            <a:r>
+              <a:rPr lang="en-US" altLang="zh-CN" sz="1600" dirty="0" smtClean="0">
+                <a:solidFill>
+                  <a:schemeClr val="accent1">
+                    <a:lumMod val="50000"/>
+                  </a:schemeClr>
+                </a:solidFill>
+                <a:latin typeface="Abadi MT Condensed Extra Bold" charset="0"/>
+                <a:ea typeface="Abadi MT Condensed Extra Bold" charset="0"/>
+                <a:cs typeface="Abadi MT Condensed Extra Bold" charset="0"/>
+              </a:rPr>
+              <a:t>positions</a:t>
+            </a:r>
+            <a:r>
+              <a:rPr lang="zh-CN" altLang="en-US" sz="1600" dirty="0" smtClean="0">
+                <a:solidFill>
+                  <a:schemeClr val="accent1">
+                    <a:lumMod val="50000"/>
+                  </a:schemeClr>
+                </a:solidFill>
+                <a:latin typeface="Abadi MT Condensed Extra Bold" charset="0"/>
+                <a:ea typeface="Abadi MT Condensed Extra Bold" charset="0"/>
+                <a:cs typeface="Abadi MT Condensed Extra Bold" charset="0"/>
+              </a:rPr>
+              <a:t> </a:t>
+            </a:r>
+            <a:r>
+              <a:rPr lang="en-US" altLang="zh-CN" sz="1600" dirty="0" smtClean="0">
+                <a:solidFill>
+                  <a:schemeClr val="accent1">
+                    <a:lumMod val="50000"/>
+                  </a:schemeClr>
+                </a:solidFill>
+                <a:latin typeface="Abadi MT Condensed Extra Bold" charset="0"/>
+                <a:ea typeface="Abadi MT Condensed Extra Bold" charset="0"/>
+                <a:cs typeface="Abadi MT Condensed Extra Bold" charset="0"/>
+              </a:rPr>
+              <a:t>of</a:t>
+            </a:r>
+            <a:r>
+              <a:rPr lang="zh-CN" altLang="en-US" sz="1600" dirty="0" smtClean="0">
+                <a:solidFill>
+                  <a:schemeClr val="accent1">
+                    <a:lumMod val="50000"/>
+                  </a:schemeClr>
+                </a:solidFill>
+                <a:latin typeface="Abadi MT Condensed Extra Bold" charset="0"/>
+                <a:ea typeface="Abadi MT Condensed Extra Bold" charset="0"/>
+                <a:cs typeface="Abadi MT Condensed Extra Bold" charset="0"/>
+              </a:rPr>
+              <a:t> </a:t>
+            </a:r>
+            <a:r>
+              <a:rPr lang="en-US" altLang="zh-CN" sz="1600" dirty="0" smtClean="0">
+                <a:solidFill>
+                  <a:schemeClr val="accent1">
+                    <a:lumMod val="50000"/>
+                  </a:schemeClr>
+                </a:solidFill>
+                <a:latin typeface="Abadi MT Condensed Extra Bold" charset="0"/>
+                <a:ea typeface="Abadi MT Condensed Extra Bold" charset="0"/>
+                <a:cs typeface="Abadi MT Condensed Extra Bold" charset="0"/>
+              </a:rPr>
+              <a:t>dots</a:t>
+            </a:r>
+            <a:r>
+              <a:rPr lang="zh-CN" altLang="en-US" sz="1600" dirty="0" smtClean="0">
+                <a:solidFill>
+                  <a:schemeClr val="accent1">
+                    <a:lumMod val="50000"/>
+                  </a:schemeClr>
+                </a:solidFill>
+                <a:latin typeface="Abadi MT Condensed Extra Bold" charset="0"/>
+                <a:ea typeface="Abadi MT Condensed Extra Bold" charset="0"/>
+                <a:cs typeface="Abadi MT Condensed Extra Bold" charset="0"/>
+              </a:rPr>
+              <a:t> </a:t>
+            </a:r>
+            <a:r>
+              <a:rPr lang="en-US" altLang="zh-CN" sz="1600" dirty="0" smtClean="0">
+                <a:solidFill>
+                  <a:schemeClr val="accent1">
+                    <a:lumMod val="50000"/>
+                  </a:schemeClr>
+                </a:solidFill>
+                <a:latin typeface="Abadi MT Condensed Extra Bold" charset="0"/>
+                <a:ea typeface="Abadi MT Condensed Extra Bold" charset="0"/>
+                <a:cs typeface="Abadi MT Condensed Extra Bold" charset="0"/>
+              </a:rPr>
+              <a:t>on</a:t>
+            </a:r>
+            <a:r>
+              <a:rPr lang="zh-CN" altLang="en-US" sz="1600" dirty="0" smtClean="0">
+                <a:solidFill>
+                  <a:schemeClr val="accent1">
+                    <a:lumMod val="50000"/>
+                  </a:schemeClr>
+                </a:solidFill>
+                <a:latin typeface="Abadi MT Condensed Extra Bold" charset="0"/>
+                <a:ea typeface="Abadi MT Condensed Extra Bold" charset="0"/>
+                <a:cs typeface="Abadi MT Condensed Extra Bold" charset="0"/>
+              </a:rPr>
+              <a:t> </a:t>
+            </a:r>
+            <a:r>
+              <a:rPr lang="en-US" altLang="zh-CN" sz="1600" dirty="0" smtClean="0">
+                <a:solidFill>
+                  <a:schemeClr val="accent1">
+                    <a:lumMod val="50000"/>
+                  </a:schemeClr>
+                </a:solidFill>
+                <a:latin typeface="Abadi MT Condensed Extra Bold" charset="0"/>
+                <a:ea typeface="Abadi MT Condensed Extra Bold" charset="0"/>
+                <a:cs typeface="Abadi MT Condensed Extra Bold" charset="0"/>
+              </a:rPr>
+              <a:t>the</a:t>
+            </a:r>
+            <a:r>
+              <a:rPr lang="zh-CN" altLang="en-US" sz="1600" dirty="0" smtClean="0">
+                <a:solidFill>
+                  <a:schemeClr val="accent1">
+                    <a:lumMod val="50000"/>
+                  </a:schemeClr>
+                </a:solidFill>
+                <a:latin typeface="Abadi MT Condensed Extra Bold" charset="0"/>
+                <a:ea typeface="Abadi MT Condensed Extra Bold" charset="0"/>
+                <a:cs typeface="Abadi MT Condensed Extra Bold" charset="0"/>
+              </a:rPr>
+              <a:t> </a:t>
+            </a:r>
+            <a:r>
+              <a:rPr lang="en-US" altLang="zh-CN" sz="1600" dirty="0" smtClean="0">
+                <a:solidFill>
+                  <a:schemeClr val="accent1">
+                    <a:lumMod val="50000"/>
+                  </a:schemeClr>
+                </a:solidFill>
+                <a:latin typeface="Abadi MT Condensed Extra Bold" charset="0"/>
+                <a:ea typeface="Abadi MT Condensed Extra Bold" charset="0"/>
+                <a:cs typeface="Abadi MT Condensed Extra Bold" charset="0"/>
+              </a:rPr>
+              <a:t>drawing</a:t>
+            </a:r>
+          </a:p>
+          <a:p>
+            <a:pPr marL="800100" lvl="1" indent="-342900">
+              <a:buFont typeface="Arial" charset="0"/>
+              <a:buChar char="•"/>
+            </a:pPr>
+            <a:r>
+              <a:rPr lang="en-US" altLang="zh-CN" sz="1600" dirty="0" smtClean="0">
+                <a:solidFill>
+                  <a:schemeClr val="accent1">
+                    <a:lumMod val="50000"/>
+                  </a:schemeClr>
+                </a:solidFill>
+                <a:latin typeface="Abadi MT Condensed Extra Bold" charset="0"/>
+                <a:ea typeface="Abadi MT Condensed Extra Bold" charset="0"/>
+                <a:cs typeface="Abadi MT Condensed Extra Bold" charset="0"/>
+              </a:rPr>
+              <a:t>Mouse</a:t>
+            </a:r>
+            <a:r>
+              <a:rPr lang="zh-CN" altLang="en-US" sz="1600" dirty="0" smtClean="0">
+                <a:solidFill>
+                  <a:schemeClr val="accent1">
+                    <a:lumMod val="50000"/>
+                  </a:schemeClr>
+                </a:solidFill>
+                <a:latin typeface="Abadi MT Condensed Extra Bold" charset="0"/>
+                <a:ea typeface="Abadi MT Condensed Extra Bold" charset="0"/>
+                <a:cs typeface="Abadi MT Condensed Extra Bold" charset="0"/>
+              </a:rPr>
+              <a:t> </a:t>
+            </a:r>
+            <a:r>
+              <a:rPr lang="en-US" altLang="zh-CN" sz="1600" dirty="0" smtClean="0">
+                <a:solidFill>
+                  <a:schemeClr val="accent1">
+                    <a:lumMod val="50000"/>
+                  </a:schemeClr>
+                </a:solidFill>
+                <a:latin typeface="Abadi MT Condensed Extra Bold" charset="0"/>
+                <a:ea typeface="Abadi MT Condensed Extra Bold" charset="0"/>
+                <a:cs typeface="Abadi MT Condensed Extra Bold" charset="0"/>
+              </a:rPr>
+              <a:t>events</a:t>
+            </a:r>
+            <a:r>
+              <a:rPr lang="zh-CN" altLang="en-US" sz="1600" dirty="0" smtClean="0">
+                <a:solidFill>
+                  <a:schemeClr val="accent1">
+                    <a:lumMod val="50000"/>
+                  </a:schemeClr>
+                </a:solidFill>
+                <a:latin typeface="Abadi MT Condensed Extra Bold" charset="0"/>
+                <a:ea typeface="Abadi MT Condensed Extra Bold" charset="0"/>
+                <a:cs typeface="Abadi MT Condensed Extra Bold" charset="0"/>
+              </a:rPr>
+              <a:t> </a:t>
+            </a:r>
+            <a:r>
+              <a:rPr lang="en-US" altLang="zh-CN" sz="1600" dirty="0" smtClean="0">
+                <a:solidFill>
+                  <a:schemeClr val="accent1">
+                    <a:lumMod val="50000"/>
+                  </a:schemeClr>
+                </a:solidFill>
+                <a:latin typeface="Abadi MT Condensed Extra Bold" charset="0"/>
+                <a:ea typeface="Abadi MT Condensed Extra Bold" charset="0"/>
+                <a:cs typeface="Abadi MT Condensed Extra Bold" charset="0"/>
+              </a:rPr>
+              <a:t>on</a:t>
+            </a:r>
+            <a:r>
+              <a:rPr lang="zh-CN" altLang="en-US" sz="1600" dirty="0" smtClean="0">
+                <a:solidFill>
+                  <a:schemeClr val="accent1">
+                    <a:lumMod val="50000"/>
+                  </a:schemeClr>
+                </a:solidFill>
+                <a:latin typeface="Abadi MT Condensed Extra Bold" charset="0"/>
+                <a:ea typeface="Abadi MT Condensed Extra Bold" charset="0"/>
+                <a:cs typeface="Abadi MT Condensed Extra Bold" charset="0"/>
+              </a:rPr>
+              <a:t> </a:t>
+            </a:r>
+            <a:r>
+              <a:rPr lang="en-US" altLang="zh-CN" sz="1600" dirty="0" smtClean="0">
+                <a:solidFill>
+                  <a:schemeClr val="accent1">
+                    <a:lumMod val="50000"/>
+                  </a:schemeClr>
+                </a:solidFill>
+                <a:latin typeface="Abadi MT Condensed Extra Bold" charset="0"/>
+                <a:ea typeface="Abadi MT Condensed Extra Bold" charset="0"/>
+                <a:cs typeface="Abadi MT Condensed Extra Bold" charset="0"/>
+              </a:rPr>
+              <a:t>dots,</a:t>
+            </a:r>
+            <a:r>
+              <a:rPr lang="zh-CN" altLang="en-US" sz="1600" dirty="0" smtClean="0">
+                <a:solidFill>
+                  <a:schemeClr val="accent1">
+                    <a:lumMod val="50000"/>
+                  </a:schemeClr>
+                </a:solidFill>
+                <a:latin typeface="Abadi MT Condensed Extra Bold" charset="0"/>
+                <a:ea typeface="Abadi MT Condensed Extra Bold" charset="0"/>
+                <a:cs typeface="Abadi MT Condensed Extra Bold" charset="0"/>
+              </a:rPr>
+              <a:t> </a:t>
+            </a:r>
+            <a:r>
+              <a:rPr lang="en-US" altLang="zh-CN" sz="1600" dirty="0" smtClean="0">
+                <a:solidFill>
+                  <a:schemeClr val="accent1">
+                    <a:lumMod val="50000"/>
+                  </a:schemeClr>
+                </a:solidFill>
+                <a:latin typeface="Abadi MT Condensed Extra Bold" charset="0"/>
+                <a:ea typeface="Abadi MT Condensed Extra Bold" charset="0"/>
+                <a:cs typeface="Abadi MT Condensed Extra Bold" charset="0"/>
+              </a:rPr>
               <a:t>show</a:t>
             </a:r>
             <a:r>
@@ -8614,7 +8889,7 @@
                 <a:ea typeface="Abadi MT Condensed Extra Bold" charset="0"/>
                 <a:cs typeface="Abadi MT Condensed Extra Bold" charset="0"/>
               </a:rPr>
-              <a:t>comparison</a:t>
+              <a:t>information</a:t>
             </a:r>
             <a:r>
               <a:rPr lang="zh-CN" altLang="en-US" sz="1600" dirty="0" smtClean="0">
@@ -8640,7 +8915,7 @@
                 <a:ea typeface="Abadi MT Condensed Extra Bold" charset="0"/>
                 <a:cs typeface="Abadi MT Condensed Extra Bold" charset="0"/>
               </a:rPr>
-              <a:t>data</a:t>
+              <a:t>of</a:t>
             </a:r>
             <a:r>
               <a:rPr lang="zh-CN" altLang="en-US" sz="1600" dirty="0" smtClean="0">
@@ -8666,7 +8941,7 @@
                 <a:ea typeface="Abadi MT Condensed Extra Bold" charset="0"/>
                 <a:cs typeface="Abadi MT Condensed Extra Bold" charset="0"/>
               </a:rPr>
-              <a:t>of</a:t>
+              <a:t>single</a:t>
             </a:r>
             <a:r>
               <a:rPr lang="zh-CN" altLang="en-US" sz="1600" dirty="0" smtClean="0">
@@ -8692,7 +8967,7 @@
                 <a:ea typeface="Abadi MT Condensed Extra Bold" charset="0"/>
                 <a:cs typeface="Abadi MT Condensed Extra Bold" charset="0"/>
               </a:rPr>
-              <a:t>buildings</a:t>
+              <a:t>building-&gt;</a:t>
             </a:r>
             <a:r>
               <a:rPr lang="zh-CN" altLang="en-US" sz="1600" dirty="0" smtClean="0">
@@ -8718,137 +8993,7 @@
                 <a:ea typeface="Abadi MT Condensed Extra Bold" charset="0"/>
                 <a:cs typeface="Abadi MT Condensed Extra Bold" charset="0"/>
               </a:rPr>
-              <a:t>in</a:t>
-            </a:r>
-            <a:r>
-              <a:rPr lang="zh-CN" altLang="en-US" sz="1600" dirty="0" smtClean="0">
-                <a:solidFill>
-                  <a:schemeClr val="accent1">
-                    <a:lumMod val="50000"/>
-                  </a:schemeClr>
-                </a:solidFill>
-                <a:latin typeface="Abadi MT Condensed Extra Bold" charset="0"/>
-                <a:ea typeface="Abadi MT Condensed Extra Bold" charset="0"/>
-                <a:cs typeface="Abadi MT Condensed Extra Bold" charset="0"/>
-              </a:rPr>
-              <a:t> </a:t>
-            </a:r>
-            <a:r>
-              <a:rPr lang="en-US" altLang="zh-CN" sz="1600" dirty="0" smtClean="0">
-                <a:solidFill>
-                  <a:schemeClr val="accent1">
-                    <a:lumMod val="50000"/>
-                  </a:schemeClr>
-                </a:solidFill>
-                <a:latin typeface="Abadi MT Condensed Extra Bold" charset="0"/>
-                <a:ea typeface="Abadi MT Condensed Extra Bold" charset="0"/>
-                <a:cs typeface="Abadi MT Condensed Extra Bold" charset="0"/>
-              </a:rPr>
-              <a:t>this</a:t>
-            </a:r>
-            <a:r>
-              <a:rPr lang="zh-CN" altLang="en-US" sz="1600" dirty="0" smtClean="0">
-                <a:solidFill>
-                  <a:schemeClr val="accent1">
-                    <a:lumMod val="50000"/>
-                  </a:schemeClr>
-                </a:solidFill>
-                <a:latin typeface="Abadi MT Condensed Extra Bold" charset="0"/>
-                <a:ea typeface="Abadi MT Condensed Extra Bold" charset="0"/>
-                <a:cs typeface="Abadi MT Condensed Extra Bold" charset="0"/>
-              </a:rPr>
-              <a:t> </a:t>
-            </a:r>
-            <a:r>
-              <a:rPr lang="en-US" altLang="zh-CN" sz="1600" dirty="0" smtClean="0">
-                <a:solidFill>
-                  <a:schemeClr val="accent1">
-                    <a:lumMod val="50000"/>
-                  </a:schemeClr>
-                </a:solidFill>
-                <a:latin typeface="Abadi MT Condensed Extra Bold" charset="0"/>
-                <a:ea typeface="Abadi MT Condensed Extra Bold" charset="0"/>
-                <a:cs typeface="Abadi MT Condensed Extra Bold" charset="0"/>
-              </a:rPr>
-              <a:t>district</a:t>
-            </a:r>
-            <a:r>
-              <a:rPr lang="zh-CN" altLang="en-US" sz="1600" dirty="0" smtClean="0">
-                <a:solidFill>
-                  <a:schemeClr val="accent1">
-                    <a:lumMod val="50000"/>
-                  </a:schemeClr>
-                </a:solidFill>
-                <a:latin typeface="Abadi MT Condensed Extra Bold" charset="0"/>
-                <a:ea typeface="Abadi MT Condensed Extra Bold" charset="0"/>
-                <a:cs typeface="Abadi MT Condensed Extra Bold" charset="0"/>
-              </a:rPr>
-              <a:t> </a:t>
-            </a:r>
-            <a:r>
-              <a:rPr lang="en-US" altLang="zh-CN" sz="1600" dirty="0" smtClean="0">
-                <a:solidFill>
-                  <a:schemeClr val="accent1">
-                    <a:lumMod val="50000"/>
-                  </a:schemeClr>
-                </a:solidFill>
-                <a:latin typeface="Abadi MT Condensed Extra Bold" charset="0"/>
-                <a:ea typeface="Abadi MT Condensed Extra Bold" charset="0"/>
-                <a:cs typeface="Abadi MT Condensed Extra Bold" charset="0"/>
-              </a:rPr>
-              <a:t>-&gt;</a:t>
-            </a:r>
-            <a:r>
-              <a:rPr lang="zh-CN" altLang="en-US" sz="1600" dirty="0" smtClean="0">
-                <a:solidFill>
-                  <a:schemeClr val="accent1">
-                    <a:lumMod val="50000"/>
-                  </a:schemeClr>
-                </a:solidFill>
-                <a:latin typeface="Abadi MT Condensed Extra Bold" charset="0"/>
-                <a:ea typeface="Abadi MT Condensed Extra Bold" charset="0"/>
-                <a:cs typeface="Abadi MT Condensed Extra Bold" charset="0"/>
-              </a:rPr>
-              <a:t> </a:t>
-            </a:r>
-            <a:r>
-              <a:rPr lang="en-US" altLang="zh-CN" sz="1600" dirty="0" smtClean="0">
-                <a:solidFill>
-                  <a:schemeClr val="accent1">
-                    <a:lumMod val="50000"/>
-                  </a:schemeClr>
-                </a:solidFill>
-                <a:latin typeface="Abadi MT Condensed Extra Bold" charset="0"/>
-                <a:ea typeface="Abadi MT Condensed Extra Bold" charset="0"/>
-                <a:cs typeface="Abadi MT Condensed Extra Bold" charset="0"/>
-              </a:rPr>
-              <a:t>bar</a:t>
-            </a:r>
-            <a:r>
-              <a:rPr lang="zh-CN" altLang="en-US" sz="1600" dirty="0" smtClean="0">
-                <a:solidFill>
-                  <a:schemeClr val="accent1">
-                    <a:lumMod val="50000"/>
-                  </a:schemeClr>
-                </a:solidFill>
-                <a:latin typeface="Abadi MT Condensed Extra Bold" charset="0"/>
-                <a:ea typeface="Abadi MT Condensed Extra Bold" charset="0"/>
-                <a:cs typeface="Abadi MT Condensed Extra Bold" charset="0"/>
-              </a:rPr>
-              <a:t> </a:t>
-            </a:r>
-            <a:r>
-              <a:rPr lang="en-US" altLang="zh-CN" sz="1600" dirty="0" smtClean="0">
-                <a:solidFill>
-                  <a:schemeClr val="accent1">
-                    <a:lumMod val="50000"/>
-                  </a:schemeClr>
-                </a:solidFill>
-                <a:latin typeface="Abadi MT Condensed Extra Bold" charset="0"/>
-                <a:ea typeface="Abadi MT Condensed Extra Bold" charset="0"/>
-                <a:cs typeface="Abadi MT Condensed Extra Bold" charset="0"/>
-              </a:rPr>
-              <a:t>chart</a:t>
+              <a:t>tooltips</a:t>
             </a:r>
             <a:r>
               <a:rPr lang="zh-CN" altLang="en-US" sz="1600" dirty="0" smtClean="0">
@@ -8890,6 +9035,386 @@
                 <a:ea typeface="Abadi MT Condensed Extra Bold" charset="0"/>
                 <a:cs typeface="Abadi MT Condensed Extra Bold" charset="0"/>
               </a:rPr>
+              <a:t>Button</a:t>
+            </a:r>
+            <a:r>
+              <a:rPr lang="zh-CN" altLang="en-US" sz="1600" dirty="0" smtClean="0">
+                <a:solidFill>
+                  <a:schemeClr val="accent1">
+                    <a:lumMod val="50000"/>
+                  </a:schemeClr>
+                </a:solidFill>
+                <a:latin typeface="Abadi MT Condensed Extra Bold" charset="0"/>
+                <a:ea typeface="Abadi MT Condensed Extra Bold" charset="0"/>
+                <a:cs typeface="Abadi MT Condensed Extra Bold" charset="0"/>
+              </a:rPr>
+              <a:t> </a:t>
+            </a:r>
+            <a:r>
+              <a:rPr lang="en-US" altLang="zh-CN" sz="1600" dirty="0" smtClean="0">
+                <a:solidFill>
+                  <a:schemeClr val="accent1">
+                    <a:lumMod val="50000"/>
+                  </a:schemeClr>
+                </a:solidFill>
+                <a:latin typeface="Abadi MT Condensed Extra Bold" charset="0"/>
+                <a:ea typeface="Abadi MT Condensed Extra Bold" charset="0"/>
+                <a:cs typeface="Abadi MT Condensed Extra Bold" charset="0"/>
+              </a:rPr>
+              <a:t>click</a:t>
+            </a:r>
+            <a:r>
+              <a:rPr lang="zh-CN" altLang="en-US" sz="1600" dirty="0" smtClean="0">
+                <a:solidFill>
+                  <a:schemeClr val="accent1">
+                    <a:lumMod val="50000"/>
+                  </a:schemeClr>
+                </a:solidFill>
+                <a:latin typeface="Abadi MT Condensed Extra Bold" charset="0"/>
+                <a:ea typeface="Abadi MT Condensed Extra Bold" charset="0"/>
+                <a:cs typeface="Abadi MT Condensed Extra Bold" charset="0"/>
+              </a:rPr>
+              <a:t> </a:t>
+            </a:r>
+            <a:r>
+              <a:rPr lang="en-US" altLang="zh-CN" sz="1600" dirty="0" smtClean="0">
+                <a:solidFill>
+                  <a:schemeClr val="accent1">
+                    <a:lumMod val="50000"/>
+                  </a:schemeClr>
+                </a:solidFill>
+                <a:latin typeface="Abadi MT Condensed Extra Bold" charset="0"/>
+                <a:ea typeface="Abadi MT Condensed Extra Bold" charset="0"/>
+                <a:cs typeface="Abadi MT Condensed Extra Bold" charset="0"/>
+              </a:rPr>
+              <a:t>function,</a:t>
+            </a:r>
+            <a:r>
+              <a:rPr lang="zh-CN" altLang="en-US" sz="1600" dirty="0" smtClean="0">
+                <a:solidFill>
+                  <a:schemeClr val="accent1">
+                    <a:lumMod val="50000"/>
+                  </a:schemeClr>
+                </a:solidFill>
+                <a:latin typeface="Abadi MT Condensed Extra Bold" charset="0"/>
+                <a:ea typeface="Abadi MT Condensed Extra Bold" charset="0"/>
+                <a:cs typeface="Abadi MT Condensed Extra Bold" charset="0"/>
+              </a:rPr>
+              <a:t> </a:t>
+            </a:r>
+            <a:r>
+              <a:rPr lang="en-US" altLang="zh-CN" sz="1600" dirty="0" smtClean="0">
+                <a:solidFill>
+                  <a:schemeClr val="accent1">
+                    <a:lumMod val="50000"/>
+                  </a:schemeClr>
+                </a:solidFill>
+                <a:latin typeface="Abadi MT Condensed Extra Bold" charset="0"/>
+                <a:ea typeface="Abadi MT Condensed Extra Bold" charset="0"/>
+                <a:cs typeface="Abadi MT Condensed Extra Bold" charset="0"/>
+              </a:rPr>
+              <a:t>show</a:t>
+            </a:r>
+            <a:r>
+              <a:rPr lang="zh-CN" altLang="en-US" sz="1600" dirty="0" smtClean="0">
+                <a:solidFill>
+                  <a:schemeClr val="accent1">
+                    <a:lumMod val="50000"/>
+                  </a:schemeClr>
+                </a:solidFill>
+                <a:latin typeface="Abadi MT Condensed Extra Bold" charset="0"/>
+                <a:ea typeface="Abadi MT Condensed Extra Bold" charset="0"/>
+                <a:cs typeface="Abadi MT Condensed Extra Bold" charset="0"/>
+              </a:rPr>
+              <a:t> </a:t>
+            </a:r>
+            <a:r>
+              <a:rPr lang="en-US" altLang="zh-CN" sz="1600" dirty="0" smtClean="0">
+                <a:solidFill>
+                  <a:schemeClr val="accent1">
+                    <a:lumMod val="50000"/>
+                  </a:schemeClr>
+                </a:solidFill>
+                <a:latin typeface="Abadi MT Condensed Extra Bold" charset="0"/>
+                <a:ea typeface="Abadi MT Condensed Extra Bold" charset="0"/>
+                <a:cs typeface="Abadi MT Condensed Extra Bold" charset="0"/>
+              </a:rPr>
+              <a:t>comparison</a:t>
+            </a:r>
+            <a:r>
+              <a:rPr lang="zh-CN" altLang="en-US" sz="1600" dirty="0" smtClean="0">
+                <a:solidFill>
+                  <a:schemeClr val="accent1">
+                    <a:lumMod val="50000"/>
+                  </a:schemeClr>
+                </a:solidFill>
+                <a:latin typeface="Abadi MT Condensed Extra Bold" charset="0"/>
+                <a:ea typeface="Abadi MT Condensed Extra Bold" charset="0"/>
+                <a:cs typeface="Abadi MT Condensed Extra Bold" charset="0"/>
+              </a:rPr>
+              <a:t> </a:t>
+            </a:r>
+            <a:r>
+              <a:rPr lang="en-US" altLang="zh-CN" sz="1600" dirty="0" smtClean="0">
+                <a:solidFill>
+                  <a:schemeClr val="accent1">
+                    <a:lumMod val="50000"/>
+                  </a:schemeClr>
+                </a:solidFill>
+                <a:latin typeface="Abadi MT Condensed Extra Bold" charset="0"/>
+                <a:ea typeface="Abadi MT Condensed Extra Bold" charset="0"/>
+                <a:cs typeface="Abadi MT Condensed Extra Bold" charset="0"/>
+              </a:rPr>
+              <a:t>data</a:t>
+            </a:r>
+            <a:r>
+              <a:rPr lang="zh-CN" altLang="en-US" sz="1600" dirty="0" smtClean="0">
+                <a:solidFill>
+                  <a:schemeClr val="accent1">
+                    <a:lumMod val="50000"/>
+                  </a:schemeClr>
+                </a:solidFill>
+                <a:latin typeface="Abadi MT Condensed Extra Bold" charset="0"/>
+                <a:ea typeface="Abadi MT Condensed Extra Bold" charset="0"/>
+                <a:cs typeface="Abadi MT Condensed Extra Bold" charset="0"/>
+              </a:rPr>
+              <a:t> </a:t>
+            </a:r>
+            <a:r>
+              <a:rPr lang="en-US" altLang="zh-CN" sz="1600" dirty="0" smtClean="0">
+                <a:solidFill>
+                  <a:schemeClr val="accent1">
+                    <a:lumMod val="50000"/>
+                  </a:schemeClr>
+                </a:solidFill>
+                <a:latin typeface="Abadi MT Condensed Extra Bold" charset="0"/>
+                <a:ea typeface="Abadi MT Condensed Extra Bold" charset="0"/>
+                <a:cs typeface="Abadi MT Condensed Extra Bold" charset="0"/>
+              </a:rPr>
+              <a:t>of</a:t>
+            </a:r>
+            <a:r>
+              <a:rPr lang="zh-CN" altLang="en-US" sz="1600" dirty="0" smtClean="0">
+                <a:solidFill>
+                  <a:schemeClr val="accent1">
+                    <a:lumMod val="50000"/>
+                  </a:schemeClr>
+                </a:solidFill>
+                <a:latin typeface="Abadi MT Condensed Extra Bold" charset="0"/>
+                <a:ea typeface="Abadi MT Condensed Extra Bold" charset="0"/>
+                <a:cs typeface="Abadi MT Condensed Extra Bold" charset="0"/>
+              </a:rPr>
+              <a:t> </a:t>
+            </a:r>
+            <a:r>
+              <a:rPr lang="en-US" altLang="zh-CN" sz="1600" dirty="0" smtClean="0">
+                <a:solidFill>
+                  <a:schemeClr val="accent1">
+                    <a:lumMod val="50000"/>
+                  </a:schemeClr>
+                </a:solidFill>
+                <a:latin typeface="Abadi MT Condensed Extra Bold" charset="0"/>
+                <a:ea typeface="Abadi MT Condensed Extra Bold" charset="0"/>
+                <a:cs typeface="Abadi MT Condensed Extra Bold" charset="0"/>
+              </a:rPr>
+              <a:t>buildings</a:t>
+            </a:r>
+            <a:r>
+              <a:rPr lang="zh-CN" altLang="en-US" sz="1600" dirty="0" smtClean="0">
+                <a:solidFill>
+                  <a:schemeClr val="accent1">
+                    <a:lumMod val="50000"/>
+                  </a:schemeClr>
+                </a:solidFill>
+                <a:latin typeface="Abadi MT Condensed Extra Bold" charset="0"/>
+                <a:ea typeface="Abadi MT Condensed Extra Bold" charset="0"/>
+                <a:cs typeface="Abadi MT Condensed Extra Bold" charset="0"/>
+              </a:rPr>
+              <a:t> </a:t>
+            </a:r>
+            <a:r>
+              <a:rPr lang="en-US" altLang="zh-CN" sz="1600" dirty="0" smtClean="0">
+                <a:solidFill>
+                  <a:schemeClr val="accent1">
+                    <a:lumMod val="50000"/>
+                  </a:schemeClr>
+                </a:solidFill>
+                <a:latin typeface="Abadi MT Condensed Extra Bold" charset="0"/>
+                <a:ea typeface="Abadi MT Condensed Extra Bold" charset="0"/>
+                <a:cs typeface="Abadi MT Condensed Extra Bold" charset="0"/>
+              </a:rPr>
+              <a:t>in</a:t>
+            </a:r>
+            <a:r>
+              <a:rPr lang="zh-CN" altLang="en-US" sz="1600" dirty="0" smtClean="0">
+                <a:solidFill>
+                  <a:schemeClr val="accent1">
+                    <a:lumMod val="50000"/>
+                  </a:schemeClr>
+                </a:solidFill>
+                <a:latin typeface="Abadi MT Condensed Extra Bold" charset="0"/>
+                <a:ea typeface="Abadi MT Condensed Extra Bold" charset="0"/>
+                <a:cs typeface="Abadi MT Condensed Extra Bold" charset="0"/>
+              </a:rPr>
+              <a:t> </a:t>
+            </a:r>
+            <a:r>
+              <a:rPr lang="en-US" altLang="zh-CN" sz="1600" dirty="0" smtClean="0">
+                <a:solidFill>
+                  <a:schemeClr val="accent1">
+                    <a:lumMod val="50000"/>
+                  </a:schemeClr>
+                </a:solidFill>
+                <a:latin typeface="Abadi MT Condensed Extra Bold" charset="0"/>
+                <a:ea typeface="Abadi MT Condensed Extra Bold" charset="0"/>
+                <a:cs typeface="Abadi MT Condensed Extra Bold" charset="0"/>
+              </a:rPr>
+              <a:t>this</a:t>
+            </a:r>
+            <a:r>
+              <a:rPr lang="zh-CN" altLang="en-US" sz="1600" dirty="0" smtClean="0">
+                <a:solidFill>
+                  <a:schemeClr val="accent1">
+                    <a:lumMod val="50000"/>
+                  </a:schemeClr>
+                </a:solidFill>
+                <a:latin typeface="Abadi MT Condensed Extra Bold" charset="0"/>
+                <a:ea typeface="Abadi MT Condensed Extra Bold" charset="0"/>
+                <a:cs typeface="Abadi MT Condensed Extra Bold" charset="0"/>
+              </a:rPr>
+              <a:t> </a:t>
+            </a:r>
+            <a:r>
+              <a:rPr lang="en-US" altLang="zh-CN" sz="1600" dirty="0" smtClean="0">
+                <a:solidFill>
+                  <a:schemeClr val="accent1">
+                    <a:lumMod val="50000"/>
+                  </a:schemeClr>
+                </a:solidFill>
+                <a:latin typeface="Abadi MT Condensed Extra Bold" charset="0"/>
+                <a:ea typeface="Abadi MT Condensed Extra Bold" charset="0"/>
+                <a:cs typeface="Abadi MT Condensed Extra Bold" charset="0"/>
+              </a:rPr>
+              <a:t>district</a:t>
+            </a:r>
+            <a:r>
+              <a:rPr lang="zh-CN" altLang="en-US" sz="1600" dirty="0" smtClean="0">
+                <a:solidFill>
+                  <a:schemeClr val="accent1">
+                    <a:lumMod val="50000"/>
+                  </a:schemeClr>
+                </a:solidFill>
+                <a:latin typeface="Abadi MT Condensed Extra Bold" charset="0"/>
+                <a:ea typeface="Abadi MT Condensed Extra Bold" charset="0"/>
+                <a:cs typeface="Abadi MT Condensed Extra Bold" charset="0"/>
+              </a:rPr>
+              <a:t> </a:t>
+            </a:r>
+            <a:r>
+              <a:rPr lang="en-US" altLang="zh-CN" sz="1600" dirty="0" smtClean="0">
+                <a:solidFill>
+                  <a:schemeClr val="accent1">
+                    <a:lumMod val="50000"/>
+                  </a:schemeClr>
+                </a:solidFill>
+                <a:latin typeface="Abadi MT Condensed Extra Bold" charset="0"/>
+                <a:ea typeface="Abadi MT Condensed Extra Bold" charset="0"/>
+                <a:cs typeface="Abadi MT Condensed Extra Bold" charset="0"/>
+              </a:rPr>
+              <a:t>-&gt;</a:t>
+            </a:r>
+            <a:r>
+              <a:rPr lang="zh-CN" altLang="en-US" sz="1600" dirty="0" smtClean="0">
+                <a:solidFill>
+                  <a:schemeClr val="accent1">
+                    <a:lumMod val="50000"/>
+                  </a:schemeClr>
+                </a:solidFill>
+                <a:latin typeface="Abadi MT Condensed Extra Bold" charset="0"/>
+                <a:ea typeface="Abadi MT Condensed Extra Bold" charset="0"/>
+                <a:cs typeface="Abadi MT Condensed Extra Bold" charset="0"/>
+              </a:rPr>
+              <a:t> </a:t>
+            </a:r>
+            <a:r>
+              <a:rPr lang="en-US" altLang="zh-CN" sz="1600" dirty="0" smtClean="0">
+                <a:solidFill>
+                  <a:schemeClr val="accent1">
+                    <a:lumMod val="50000"/>
+                  </a:schemeClr>
+                </a:solidFill>
+                <a:latin typeface="Abadi MT Condensed Extra Bold" charset="0"/>
+                <a:ea typeface="Abadi MT Condensed Extra Bold" charset="0"/>
+                <a:cs typeface="Abadi MT Condensed Extra Bold" charset="0"/>
+              </a:rPr>
+              <a:t>bar</a:t>
+            </a:r>
+            <a:r>
+              <a:rPr lang="zh-CN" altLang="en-US" sz="1600" dirty="0" smtClean="0">
+                <a:solidFill>
+                  <a:schemeClr val="accent1">
+                    <a:lumMod val="50000"/>
+                  </a:schemeClr>
+                </a:solidFill>
+                <a:latin typeface="Abadi MT Condensed Extra Bold" charset="0"/>
+                <a:ea typeface="Abadi MT Condensed Extra Bold" charset="0"/>
+                <a:cs typeface="Abadi MT Condensed Extra Bold" charset="0"/>
+              </a:rPr>
+              <a:t> </a:t>
+            </a:r>
+            <a:r>
+              <a:rPr lang="en-US" altLang="zh-CN" sz="1600" dirty="0" smtClean="0">
+                <a:solidFill>
+                  <a:schemeClr val="accent1">
+                    <a:lumMod val="50000"/>
+                  </a:schemeClr>
+                </a:solidFill>
+                <a:latin typeface="Abadi MT Condensed Extra Bold" charset="0"/>
+                <a:ea typeface="Abadi MT Condensed Extra Bold" charset="0"/>
+                <a:cs typeface="Abadi MT Condensed Extra Bold" charset="0"/>
+              </a:rPr>
+              <a:t>chart</a:t>
+            </a:r>
+            <a:r>
+              <a:rPr lang="zh-CN" altLang="en-US" sz="1600" dirty="0" smtClean="0">
+                <a:solidFill>
+                  <a:schemeClr val="accent1">
+                    <a:lumMod val="50000"/>
+                  </a:schemeClr>
+                </a:solidFill>
+                <a:latin typeface="Abadi MT Condensed Extra Bold" charset="0"/>
+                <a:ea typeface="Abadi MT Condensed Extra Bold" charset="0"/>
+                <a:cs typeface="Abadi MT Condensed Extra Bold" charset="0"/>
+              </a:rPr>
+              <a:t> </a:t>
+            </a:r>
+            <a:endParaRPr lang="en-US" altLang="zh-CN" sz="1600" dirty="0" smtClean="0">
+              <a:solidFill>
+                <a:schemeClr val="accent1">
+                  <a:lumMod val="50000"/>
+                </a:schemeClr>
+              </a:solidFill>
+              <a:latin typeface="Abadi MT Condensed Extra Bold" charset="0"/>
+              <a:ea typeface="Abadi MT Condensed Extra Bold" charset="0"/>
+              <a:cs typeface="Abadi MT Condensed Extra Bold" charset="0"/>
+            </a:endParaRPr>
+          </a:p>
+          <a:p>
+            <a:pPr marL="800100" lvl="1" indent="-342900">
+              <a:buFont typeface="Arial" charset="0"/>
+              <a:buChar char="•"/>
+            </a:pPr>
+            <a:r>
+              <a:rPr lang="en-US" altLang="zh-CN" sz="1600" dirty="0" smtClean="0">
+                <a:solidFill>
+                  <a:schemeClr val="accent1">
+                    <a:lumMod val="50000"/>
+                  </a:schemeClr>
+                </a:solidFill>
+                <a:latin typeface="Abadi MT Condensed Extra Bold" charset="0"/>
+                <a:ea typeface="Abadi MT Condensed Extra Bold" charset="0"/>
+                <a:cs typeface="Abadi MT Condensed Extra Bold" charset="0"/>
+              </a:rPr>
               <a:t>Choose</a:t>
             </a:r>
             <a:r>
@@ -8942,7 +9467,7 @@
                 <a:ea typeface="Abadi MT Condensed Extra Bold" charset="0"/>
                 <a:cs typeface="Abadi MT Condensed Extra Bold" charset="0"/>
               </a:rPr>
-              <a:t>neighborhood,</a:t>
+              <a:t>city,</a:t>
             </a:r>
             <a:r>
               <a:rPr lang="zh-CN" altLang="en-US" sz="1600" dirty="0" smtClean="0">
@@ -8958,7 +9483,7 @@
               <a:t> </a:t>
             </a:r>
             <a:r>
-              <a:rPr lang="mr-IN" altLang="zh-CN" sz="1600" smtClean="0">
+              <a:rPr lang="mr-IN" altLang="zh-CN" sz="1600" dirty="0" smtClean="0">
                 <a:solidFill>
                   <a:schemeClr val="accent1">
                     <a:lumMod val="50000"/>
@@ -9024,6 +9549,13 @@
   <p:clrMapOvr>
     <a:masterClrMapping/>
   </p:clrMapOvr>
+  <p:timing>
+    <p:tnLst>
+      <p:par>
+        <p:cTn id="1" dur="indefinite" restart="never" nodeType="tmRoot"/>
+      </p:par>
+    </p:tnLst>
+  </p:timing>
 </p:sld>
 </file>
 

</xml_diff>

<commit_message>
update the ppt file
</commit_message>
<xml_diff>
--- a/PS02/Final Project-VisualTech.pptx
+++ b/PS02/Final Project-VisualTech.pptx
@@ -201,7 +201,7 @@
           <a:p>
             <a:fld id="{4993B7B4-03FD-384B-9630-3DAF84717B34}" type="datetimeFigureOut">
               <a:rPr lang="en-US" smtClean="0"/>
-              <a:t>11/12/17</a:t>
+              <a:t>11/13/17</a:t>
             </a:fld>
             <a:endParaRPr lang="en-US"/>
           </a:p>
@@ -852,7 +852,7 @@
           <a:p>
             <a:fld id="{1E655F4A-45FD-154A-BB7A-93D28B32DE11}" type="datetimeFigureOut">
               <a:rPr lang="en-US" smtClean="0"/>
-              <a:t>11/12/17</a:t>
+              <a:t>11/13/17</a:t>
             </a:fld>
             <a:endParaRPr lang="en-US"/>
           </a:p>
@@ -1022,7 +1022,7 @@
           <a:p>
             <a:fld id="{1E655F4A-45FD-154A-BB7A-93D28B32DE11}" type="datetimeFigureOut">
               <a:rPr lang="en-US" smtClean="0"/>
-              <a:t>11/12/17</a:t>
+              <a:t>11/13/17</a:t>
             </a:fld>
             <a:endParaRPr lang="en-US"/>
           </a:p>
@@ -1202,7 +1202,7 @@
           <a:p>
             <a:fld id="{1E655F4A-45FD-154A-BB7A-93D28B32DE11}" type="datetimeFigureOut">
               <a:rPr lang="en-US" smtClean="0"/>
-              <a:t>11/12/17</a:t>
+              <a:t>11/13/17</a:t>
             </a:fld>
             <a:endParaRPr lang="en-US"/>
           </a:p>
@@ -1372,7 +1372,7 @@
           <a:p>
             <a:fld id="{1E655F4A-45FD-154A-BB7A-93D28B32DE11}" type="datetimeFigureOut">
               <a:rPr lang="en-US" smtClean="0"/>
-              <a:t>11/12/17</a:t>
+              <a:t>11/13/17</a:t>
             </a:fld>
             <a:endParaRPr lang="en-US"/>
           </a:p>
@@ -1618,7 +1618,7 @@
           <a:p>
             <a:fld id="{1E655F4A-45FD-154A-BB7A-93D28B32DE11}" type="datetimeFigureOut">
               <a:rPr lang="en-US" smtClean="0"/>
-              <a:t>11/12/17</a:t>
+              <a:t>11/13/17</a:t>
             </a:fld>
             <a:endParaRPr lang="en-US"/>
           </a:p>
@@ -1850,7 +1850,7 @@
           <a:p>
             <a:fld id="{1E655F4A-45FD-154A-BB7A-93D28B32DE11}" type="datetimeFigureOut">
               <a:rPr lang="en-US" smtClean="0"/>
-              <a:t>11/12/17</a:t>
+              <a:t>11/13/17</a:t>
             </a:fld>
             <a:endParaRPr lang="en-US"/>
           </a:p>
@@ -2217,7 +2217,7 @@
           <a:p>
             <a:fld id="{1E655F4A-45FD-154A-BB7A-93D28B32DE11}" type="datetimeFigureOut">
               <a:rPr lang="en-US" smtClean="0"/>
-              <a:t>11/12/17</a:t>
+              <a:t>11/13/17</a:t>
             </a:fld>
             <a:endParaRPr lang="en-US"/>
           </a:p>
@@ -2335,7 +2335,7 @@
           <a:p>
             <a:fld id="{1E655F4A-45FD-154A-BB7A-93D28B32DE11}" type="datetimeFigureOut">
               <a:rPr lang="en-US" smtClean="0"/>
-              <a:t>11/12/17</a:t>
+              <a:t>11/13/17</a:t>
             </a:fld>
             <a:endParaRPr lang="en-US"/>
           </a:p>
@@ -2430,7 +2430,7 @@
           <a:p>
             <a:fld id="{1E655F4A-45FD-154A-BB7A-93D28B32DE11}" type="datetimeFigureOut">
               <a:rPr lang="en-US" smtClean="0"/>
-              <a:t>11/12/17</a:t>
+              <a:t>11/13/17</a:t>
             </a:fld>
             <a:endParaRPr lang="en-US"/>
           </a:p>
@@ -2707,7 +2707,7 @@
           <a:p>
             <a:fld id="{1E655F4A-45FD-154A-BB7A-93D28B32DE11}" type="datetimeFigureOut">
               <a:rPr lang="en-US" smtClean="0"/>
-              <a:t>11/12/17</a:t>
+              <a:t>11/13/17</a:t>
             </a:fld>
             <a:endParaRPr lang="en-US"/>
           </a:p>
@@ -2960,7 +2960,7 @@
           <a:p>
             <a:fld id="{1E655F4A-45FD-154A-BB7A-93D28B32DE11}" type="datetimeFigureOut">
               <a:rPr lang="en-US" smtClean="0"/>
-              <a:t>11/12/17</a:t>
+              <a:t>11/13/17</a:t>
             </a:fld>
             <a:endParaRPr lang="en-US"/>
           </a:p>
@@ -3173,7 +3173,7 @@
           <a:p>
             <a:fld id="{1E655F4A-45FD-154A-BB7A-93D28B32DE11}" type="datetimeFigureOut">
               <a:rPr lang="en-US" smtClean="0"/>
-              <a:t>11/12/17</a:t>
+              <a:t>11/13/17</a:t>
             </a:fld>
             <a:endParaRPr lang="en-US"/>
           </a:p>
@@ -6784,7 +6784,7 @@
         <p:spPr>
           <a:xfrm>
             <a:off x="863918" y="1792929"/>
-            <a:ext cx="8125366" cy="4493538"/>
+            <a:ext cx="10817448" cy="4985980"/>
           </a:xfrm>
           <a:prstGeom prst="rect">
             <a:avLst/>
@@ -6827,8 +6827,869 @@
                 <a:ea typeface="Abadi MT Condensed Extra Bold" charset="0"/>
                 <a:cs typeface="Abadi MT Condensed Extra Bold" charset="0"/>
               </a:rPr>
-              <a:t>No</a:t>
-            </a:r>
+              <a:t>Maps</a:t>
+            </a:r>
+            <a:r>
+              <a:rPr lang="zh-CN" altLang="en-US" sz="1600" dirty="0" smtClean="0">
+                <a:solidFill>
+                  <a:schemeClr val="accent1">
+                    <a:lumMod val="50000"/>
+                  </a:schemeClr>
+                </a:solidFill>
+                <a:latin typeface="Abadi MT Condensed Extra Bold" charset="0"/>
+                <a:ea typeface="Abadi MT Condensed Extra Bold" charset="0"/>
+                <a:cs typeface="Abadi MT Condensed Extra Bold" charset="0"/>
+              </a:rPr>
+              <a:t> </a:t>
+            </a:r>
+            <a:r>
+              <a:rPr lang="en-US" altLang="zh-CN" sz="1600" dirty="0" smtClean="0">
+                <a:solidFill>
+                  <a:schemeClr val="accent1">
+                    <a:lumMod val="50000"/>
+                  </a:schemeClr>
+                </a:solidFill>
+                <a:latin typeface="Abadi MT Condensed Extra Bold" charset="0"/>
+                <a:ea typeface="Abadi MT Condensed Extra Bold" charset="0"/>
+                <a:cs typeface="Abadi MT Condensed Extra Bold" charset="0"/>
+              </a:rPr>
+              <a:t>of</a:t>
+            </a:r>
+            <a:r>
+              <a:rPr lang="zh-CN" altLang="en-US" sz="1600" dirty="0" smtClean="0">
+                <a:solidFill>
+                  <a:schemeClr val="accent1">
+                    <a:lumMod val="50000"/>
+                  </a:schemeClr>
+                </a:solidFill>
+                <a:latin typeface="Abadi MT Condensed Extra Bold" charset="0"/>
+                <a:ea typeface="Abadi MT Condensed Extra Bold" charset="0"/>
+                <a:cs typeface="Abadi MT Condensed Extra Bold" charset="0"/>
+              </a:rPr>
+              <a:t> </a:t>
+            </a:r>
+            <a:r>
+              <a:rPr lang="en-US" altLang="zh-CN" sz="1600" dirty="0" smtClean="0">
+                <a:solidFill>
+                  <a:schemeClr val="accent1">
+                    <a:lumMod val="50000"/>
+                  </a:schemeClr>
+                </a:solidFill>
+                <a:latin typeface="Abadi MT Condensed Extra Bold" charset="0"/>
+                <a:ea typeface="Abadi MT Condensed Extra Bold" charset="0"/>
+                <a:cs typeface="Abadi MT Condensed Extra Bold" charset="0"/>
+              </a:rPr>
+              <a:t>different</a:t>
+            </a:r>
+            <a:r>
+              <a:rPr lang="zh-CN" altLang="en-US" sz="1600" dirty="0" smtClean="0">
+                <a:solidFill>
+                  <a:schemeClr val="accent1">
+                    <a:lumMod val="50000"/>
+                  </a:schemeClr>
+                </a:solidFill>
+                <a:latin typeface="Abadi MT Condensed Extra Bold" charset="0"/>
+                <a:ea typeface="Abadi MT Condensed Extra Bold" charset="0"/>
+                <a:cs typeface="Abadi MT Condensed Extra Bold" charset="0"/>
+              </a:rPr>
+              <a:t> </a:t>
+            </a:r>
+            <a:r>
+              <a:rPr lang="en-US" altLang="zh-CN" sz="1600" dirty="0" smtClean="0">
+                <a:solidFill>
+                  <a:schemeClr val="accent1">
+                    <a:lumMod val="50000"/>
+                  </a:schemeClr>
+                </a:solidFill>
+                <a:latin typeface="Abadi MT Condensed Extra Bold" charset="0"/>
+                <a:ea typeface="Abadi MT Condensed Extra Bold" charset="0"/>
+                <a:cs typeface="Abadi MT Condensed Extra Bold" charset="0"/>
+              </a:rPr>
+              <a:t>cities</a:t>
+            </a:r>
+          </a:p>
+          <a:p>
+            <a:pPr marL="800100" lvl="1" indent="-342900">
+              <a:buFont typeface="Arial" charset="0"/>
+              <a:buChar char="•"/>
+            </a:pPr>
+            <a:r>
+              <a:rPr lang="en-US" altLang="zh-CN" sz="1600" dirty="0" smtClean="0">
+                <a:solidFill>
+                  <a:schemeClr val="accent1">
+                    <a:lumMod val="50000"/>
+                  </a:schemeClr>
+                </a:solidFill>
+                <a:latin typeface="Abadi MT Condensed Extra Bold" charset="0"/>
+                <a:ea typeface="Abadi MT Condensed Extra Bold" charset="0"/>
+                <a:cs typeface="Abadi MT Condensed Extra Bold" charset="0"/>
+              </a:rPr>
+              <a:t>How</a:t>
+            </a:r>
+            <a:r>
+              <a:rPr lang="zh-CN" altLang="en-US" sz="1600" dirty="0" smtClean="0">
+                <a:solidFill>
+                  <a:schemeClr val="accent1">
+                    <a:lumMod val="50000"/>
+                  </a:schemeClr>
+                </a:solidFill>
+                <a:latin typeface="Abadi MT Condensed Extra Bold" charset="0"/>
+                <a:ea typeface="Abadi MT Condensed Extra Bold" charset="0"/>
+                <a:cs typeface="Abadi MT Condensed Extra Bold" charset="0"/>
+              </a:rPr>
+              <a:t> </a:t>
+            </a:r>
+            <a:r>
+              <a:rPr lang="en-US" altLang="zh-CN" sz="1600" dirty="0" smtClean="0">
+                <a:solidFill>
+                  <a:schemeClr val="accent1">
+                    <a:lumMod val="50000"/>
+                  </a:schemeClr>
+                </a:solidFill>
+                <a:latin typeface="Abadi MT Condensed Extra Bold" charset="0"/>
+                <a:ea typeface="Abadi MT Condensed Extra Bold" charset="0"/>
+                <a:cs typeface="Abadi MT Condensed Extra Bold" charset="0"/>
+              </a:rPr>
+              <a:t>to</a:t>
+            </a:r>
+            <a:r>
+              <a:rPr lang="zh-CN" altLang="en-US" sz="1600" dirty="0" smtClean="0">
+                <a:solidFill>
+                  <a:schemeClr val="accent1">
+                    <a:lumMod val="50000"/>
+                  </a:schemeClr>
+                </a:solidFill>
+                <a:latin typeface="Abadi MT Condensed Extra Bold" charset="0"/>
+                <a:ea typeface="Abadi MT Condensed Extra Bold" charset="0"/>
+                <a:cs typeface="Abadi MT Condensed Extra Bold" charset="0"/>
+              </a:rPr>
+              <a:t> </a:t>
+            </a:r>
+            <a:r>
+              <a:rPr lang="en-US" altLang="zh-CN" sz="1600" dirty="0" smtClean="0">
+                <a:solidFill>
+                  <a:schemeClr val="accent1">
+                    <a:lumMod val="50000"/>
+                  </a:schemeClr>
+                </a:solidFill>
+                <a:latin typeface="Abadi MT Condensed Extra Bold" charset="0"/>
+                <a:ea typeface="Abadi MT Condensed Extra Bold" charset="0"/>
+                <a:cs typeface="Abadi MT Condensed Extra Bold" charset="0"/>
+              </a:rPr>
+              <a:t>auto</a:t>
+            </a:r>
+            <a:r>
+              <a:rPr lang="zh-CN" altLang="en-US" sz="1600" dirty="0" smtClean="0">
+                <a:solidFill>
+                  <a:schemeClr val="accent1">
+                    <a:lumMod val="50000"/>
+                  </a:schemeClr>
+                </a:solidFill>
+                <a:latin typeface="Abadi MT Condensed Extra Bold" charset="0"/>
+                <a:ea typeface="Abadi MT Condensed Extra Bold" charset="0"/>
+                <a:cs typeface="Abadi MT Condensed Extra Bold" charset="0"/>
+              </a:rPr>
+              <a:t> </a:t>
+            </a:r>
+            <a:r>
+              <a:rPr lang="en-US" altLang="zh-CN" sz="1600" dirty="0" smtClean="0">
+                <a:solidFill>
+                  <a:schemeClr val="accent1">
+                    <a:lumMod val="50000"/>
+                  </a:schemeClr>
+                </a:solidFill>
+                <a:latin typeface="Abadi MT Condensed Extra Bold" charset="0"/>
+                <a:ea typeface="Abadi MT Condensed Extra Bold" charset="0"/>
+                <a:cs typeface="Abadi MT Condensed Extra Bold" charset="0"/>
+              </a:rPr>
+              <a:t>scale</a:t>
+            </a:r>
+            <a:r>
+              <a:rPr lang="zh-CN" altLang="en-US" sz="1600" dirty="0" smtClean="0">
+                <a:solidFill>
+                  <a:schemeClr val="accent1">
+                    <a:lumMod val="50000"/>
+                  </a:schemeClr>
+                </a:solidFill>
+                <a:latin typeface="Abadi MT Condensed Extra Bold" charset="0"/>
+                <a:ea typeface="Abadi MT Condensed Extra Bold" charset="0"/>
+                <a:cs typeface="Abadi MT Condensed Extra Bold" charset="0"/>
+              </a:rPr>
+              <a:t> </a:t>
+            </a:r>
+            <a:r>
+              <a:rPr lang="en-US" altLang="zh-CN" sz="1600" dirty="0" smtClean="0">
+                <a:solidFill>
+                  <a:schemeClr val="accent1">
+                    <a:lumMod val="50000"/>
+                  </a:schemeClr>
+                </a:solidFill>
+                <a:latin typeface="Abadi MT Condensed Extra Bold" charset="0"/>
+                <a:ea typeface="Abadi MT Condensed Extra Bold" charset="0"/>
+                <a:cs typeface="Abadi MT Condensed Extra Bold" charset="0"/>
+              </a:rPr>
+              <a:t>of</a:t>
+            </a:r>
+            <a:r>
+              <a:rPr lang="zh-CN" altLang="en-US" sz="1600" dirty="0" smtClean="0">
+                <a:solidFill>
+                  <a:schemeClr val="accent1">
+                    <a:lumMod val="50000"/>
+                  </a:schemeClr>
+                </a:solidFill>
+                <a:latin typeface="Abadi MT Condensed Extra Bold" charset="0"/>
+                <a:ea typeface="Abadi MT Condensed Extra Bold" charset="0"/>
+                <a:cs typeface="Abadi MT Condensed Extra Bold" charset="0"/>
+              </a:rPr>
+              <a:t> </a:t>
+            </a:r>
+            <a:r>
+              <a:rPr lang="en-US" altLang="zh-CN" sz="1600" dirty="0" smtClean="0">
+                <a:solidFill>
+                  <a:schemeClr val="accent1">
+                    <a:lumMod val="50000"/>
+                  </a:schemeClr>
+                </a:solidFill>
+                <a:latin typeface="Abadi MT Condensed Extra Bold" charset="0"/>
+                <a:ea typeface="Abadi MT Condensed Extra Bold" charset="0"/>
+                <a:cs typeface="Abadi MT Condensed Extra Bold" charset="0"/>
+              </a:rPr>
+              <a:t>the</a:t>
+            </a:r>
+            <a:r>
+              <a:rPr lang="zh-CN" altLang="en-US" sz="1600" dirty="0" smtClean="0">
+                <a:solidFill>
+                  <a:schemeClr val="accent1">
+                    <a:lumMod val="50000"/>
+                  </a:schemeClr>
+                </a:solidFill>
+                <a:latin typeface="Abadi MT Condensed Extra Bold" charset="0"/>
+                <a:ea typeface="Abadi MT Condensed Extra Bold" charset="0"/>
+                <a:cs typeface="Abadi MT Condensed Extra Bold" charset="0"/>
+              </a:rPr>
+              <a:t> </a:t>
+            </a:r>
+            <a:r>
+              <a:rPr lang="en-US" altLang="zh-CN" sz="1600" dirty="0" smtClean="0">
+                <a:solidFill>
+                  <a:schemeClr val="accent1">
+                    <a:lumMod val="50000"/>
+                  </a:schemeClr>
+                </a:solidFill>
+                <a:latin typeface="Abadi MT Condensed Extra Bold" charset="0"/>
+                <a:ea typeface="Abadi MT Condensed Extra Bold" charset="0"/>
+                <a:cs typeface="Abadi MT Condensed Extra Bold" charset="0"/>
+              </a:rPr>
+              <a:t>scale</a:t>
+            </a:r>
+            <a:r>
+              <a:rPr lang="zh-CN" altLang="en-US" sz="1600" dirty="0" smtClean="0">
+                <a:solidFill>
+                  <a:schemeClr val="accent1">
+                    <a:lumMod val="50000"/>
+                  </a:schemeClr>
+                </a:solidFill>
+                <a:latin typeface="Abadi MT Condensed Extra Bold" charset="0"/>
+                <a:ea typeface="Abadi MT Condensed Extra Bold" charset="0"/>
+                <a:cs typeface="Abadi MT Condensed Extra Bold" charset="0"/>
+              </a:rPr>
+              <a:t> </a:t>
+            </a:r>
+            <a:r>
+              <a:rPr lang="en-US" altLang="zh-CN" sz="1600" dirty="0" smtClean="0">
+                <a:solidFill>
+                  <a:schemeClr val="accent1">
+                    <a:lumMod val="50000"/>
+                  </a:schemeClr>
+                </a:solidFill>
+                <a:latin typeface="Abadi MT Condensed Extra Bold" charset="0"/>
+                <a:ea typeface="Abadi MT Condensed Extra Bold" charset="0"/>
+                <a:cs typeface="Abadi MT Condensed Extra Bold" charset="0"/>
+              </a:rPr>
+              <a:t>of</a:t>
+            </a:r>
+            <a:r>
+              <a:rPr lang="zh-CN" altLang="en-US" sz="1600" dirty="0" smtClean="0">
+                <a:solidFill>
+                  <a:schemeClr val="accent1">
+                    <a:lumMod val="50000"/>
+                  </a:schemeClr>
+                </a:solidFill>
+                <a:latin typeface="Abadi MT Condensed Extra Bold" charset="0"/>
+                <a:ea typeface="Abadi MT Condensed Extra Bold" charset="0"/>
+                <a:cs typeface="Abadi MT Condensed Extra Bold" charset="0"/>
+              </a:rPr>
+              <a:t> </a:t>
+            </a:r>
+            <a:r>
+              <a:rPr lang="en-US" altLang="zh-CN" sz="1600" dirty="0" smtClean="0">
+                <a:solidFill>
+                  <a:schemeClr val="accent1">
+                    <a:lumMod val="50000"/>
+                  </a:schemeClr>
+                </a:solidFill>
+                <a:latin typeface="Abadi MT Condensed Extra Bold" charset="0"/>
+                <a:ea typeface="Abadi MT Condensed Extra Bold" charset="0"/>
+                <a:cs typeface="Abadi MT Condensed Extra Bold" charset="0"/>
+              </a:rPr>
+              <a:t>map</a:t>
+            </a:r>
+            <a:r>
+              <a:rPr lang="zh-CN" altLang="en-US" sz="1600" dirty="0" smtClean="0">
+                <a:solidFill>
+                  <a:schemeClr val="accent1">
+                    <a:lumMod val="50000"/>
+                  </a:schemeClr>
+                </a:solidFill>
+                <a:latin typeface="Abadi MT Condensed Extra Bold" charset="0"/>
+                <a:ea typeface="Abadi MT Condensed Extra Bold" charset="0"/>
+                <a:cs typeface="Abadi MT Condensed Extra Bold" charset="0"/>
+              </a:rPr>
+              <a:t> </a:t>
+            </a:r>
+            <a:r>
+              <a:rPr lang="en-US" altLang="zh-CN" sz="1600" dirty="0" smtClean="0">
+                <a:solidFill>
+                  <a:schemeClr val="accent1">
+                    <a:lumMod val="50000"/>
+                  </a:schemeClr>
+                </a:solidFill>
+                <a:latin typeface="Abadi MT Condensed Extra Bold" charset="0"/>
+                <a:ea typeface="Abadi MT Condensed Extra Bold" charset="0"/>
+                <a:cs typeface="Abadi MT Condensed Extra Bold" charset="0"/>
+              </a:rPr>
+              <a:t>-&gt;</a:t>
+            </a:r>
+            <a:r>
+              <a:rPr lang="zh-CN" altLang="en-US" sz="1600" dirty="0" smtClean="0">
+                <a:solidFill>
+                  <a:schemeClr val="accent1">
+                    <a:lumMod val="50000"/>
+                  </a:schemeClr>
+                </a:solidFill>
+                <a:latin typeface="Abadi MT Condensed Extra Bold" charset="0"/>
+                <a:ea typeface="Abadi MT Condensed Extra Bold" charset="0"/>
+                <a:cs typeface="Abadi MT Condensed Extra Bold" charset="0"/>
+              </a:rPr>
+              <a:t> </a:t>
+            </a:r>
+            <a:r>
+              <a:rPr lang="en-US" altLang="zh-CN" sz="1600" dirty="0" smtClean="0">
+                <a:solidFill>
+                  <a:schemeClr val="accent1">
+                    <a:lumMod val="50000"/>
+                  </a:schemeClr>
+                </a:solidFill>
+                <a:latin typeface="Abadi MT Condensed Extra Bold" charset="0"/>
+                <a:ea typeface="Abadi MT Condensed Extra Bold" charset="0"/>
+                <a:cs typeface="Abadi MT Condensed Extra Bold" charset="0"/>
+              </a:rPr>
+              <a:t>have</a:t>
+            </a:r>
+            <a:r>
+              <a:rPr lang="zh-CN" altLang="en-US" sz="1600" dirty="0" smtClean="0">
+                <a:solidFill>
+                  <a:schemeClr val="accent1">
+                    <a:lumMod val="50000"/>
+                  </a:schemeClr>
+                </a:solidFill>
+                <a:latin typeface="Abadi MT Condensed Extra Bold" charset="0"/>
+                <a:ea typeface="Abadi MT Condensed Extra Bold" charset="0"/>
+                <a:cs typeface="Abadi MT Condensed Extra Bold" charset="0"/>
+              </a:rPr>
+              <a:t> </a:t>
+            </a:r>
+            <a:r>
+              <a:rPr lang="en-US" altLang="zh-CN" sz="1600" dirty="0" smtClean="0">
+                <a:solidFill>
+                  <a:schemeClr val="accent1">
+                    <a:lumMod val="50000"/>
+                  </a:schemeClr>
+                </a:solidFill>
+                <a:latin typeface="Abadi MT Condensed Extra Bold" charset="0"/>
+                <a:ea typeface="Abadi MT Condensed Extra Bold" charset="0"/>
+                <a:cs typeface="Abadi MT Condensed Extra Bold" charset="0"/>
+              </a:rPr>
+              <a:t>no</a:t>
+            </a:r>
+            <a:r>
+              <a:rPr lang="zh-CN" altLang="en-US" sz="1600" dirty="0" smtClean="0">
+                <a:solidFill>
+                  <a:schemeClr val="accent1">
+                    <a:lumMod val="50000"/>
+                  </a:schemeClr>
+                </a:solidFill>
+                <a:latin typeface="Abadi MT Condensed Extra Bold" charset="0"/>
+                <a:ea typeface="Abadi MT Condensed Extra Bold" charset="0"/>
+                <a:cs typeface="Abadi MT Condensed Extra Bold" charset="0"/>
+              </a:rPr>
+              <a:t> </a:t>
+            </a:r>
+            <a:r>
+              <a:rPr lang="en-US" altLang="zh-CN" sz="1600" dirty="0" smtClean="0">
+                <a:solidFill>
+                  <a:schemeClr val="accent1">
+                    <a:lumMod val="50000"/>
+                  </a:schemeClr>
+                </a:solidFill>
+                <a:latin typeface="Abadi MT Condensed Extra Bold" charset="0"/>
+                <a:ea typeface="Abadi MT Condensed Extra Bold" charset="0"/>
+                <a:cs typeface="Abadi MT Condensed Extra Bold" charset="0"/>
+              </a:rPr>
+              <a:t>idea</a:t>
+            </a:r>
+            <a:r>
+              <a:rPr lang="zh-CN" altLang="en-US" sz="1600" dirty="0" smtClean="0">
+                <a:solidFill>
+                  <a:schemeClr val="accent1">
+                    <a:lumMod val="50000"/>
+                  </a:schemeClr>
+                </a:solidFill>
+                <a:latin typeface="Abadi MT Condensed Extra Bold" charset="0"/>
+                <a:ea typeface="Abadi MT Condensed Extra Bold" charset="0"/>
+                <a:cs typeface="Abadi MT Condensed Extra Bold" charset="0"/>
+              </a:rPr>
+              <a:t> </a:t>
+            </a:r>
+            <a:r>
+              <a:rPr lang="en-US" altLang="zh-CN" sz="1600" dirty="0" smtClean="0">
+                <a:solidFill>
+                  <a:schemeClr val="accent1">
+                    <a:lumMod val="50000"/>
+                  </a:schemeClr>
+                </a:solidFill>
+                <a:latin typeface="Abadi MT Condensed Extra Bold" charset="0"/>
+                <a:ea typeface="Abadi MT Condensed Extra Bold" charset="0"/>
+                <a:cs typeface="Abadi MT Condensed Extra Bold" charset="0"/>
+              </a:rPr>
+              <a:t>about</a:t>
+            </a:r>
+            <a:r>
+              <a:rPr lang="zh-CN" altLang="en-US" sz="1600" dirty="0" smtClean="0">
+                <a:solidFill>
+                  <a:schemeClr val="accent1">
+                    <a:lumMod val="50000"/>
+                  </a:schemeClr>
+                </a:solidFill>
+                <a:latin typeface="Abadi MT Condensed Extra Bold" charset="0"/>
+                <a:ea typeface="Abadi MT Condensed Extra Bold" charset="0"/>
+                <a:cs typeface="Abadi MT Condensed Extra Bold" charset="0"/>
+              </a:rPr>
+              <a:t> </a:t>
+            </a:r>
+            <a:r>
+              <a:rPr lang="en-US" altLang="zh-CN" sz="1600" dirty="0" smtClean="0">
+                <a:solidFill>
+                  <a:schemeClr val="accent1">
+                    <a:lumMod val="50000"/>
+                  </a:schemeClr>
+                </a:solidFill>
+                <a:latin typeface="Abadi MT Condensed Extra Bold" charset="0"/>
+                <a:ea typeface="Abadi MT Condensed Extra Bold" charset="0"/>
+                <a:cs typeface="Abadi MT Condensed Extra Bold" charset="0"/>
+              </a:rPr>
+              <a:t>it</a:t>
+            </a:r>
+            <a:r>
+              <a:rPr lang="zh-CN" altLang="en-US" sz="1600" dirty="0" smtClean="0">
+                <a:solidFill>
+                  <a:schemeClr val="accent1">
+                    <a:lumMod val="50000"/>
+                  </a:schemeClr>
+                </a:solidFill>
+                <a:latin typeface="Abadi MT Condensed Extra Bold" charset="0"/>
+                <a:ea typeface="Abadi MT Condensed Extra Bold" charset="0"/>
+                <a:cs typeface="Abadi MT Condensed Extra Bold" charset="0"/>
+              </a:rPr>
+              <a:t> </a:t>
+            </a:r>
+            <a:r>
+              <a:rPr lang="en-US" altLang="zh-CN" sz="1600" dirty="0" smtClean="0">
+                <a:solidFill>
+                  <a:schemeClr val="accent1">
+                    <a:lumMod val="50000"/>
+                  </a:schemeClr>
+                </a:solidFill>
+                <a:latin typeface="Abadi MT Condensed Extra Bold" charset="0"/>
+                <a:ea typeface="Abadi MT Condensed Extra Bold" charset="0"/>
+                <a:cs typeface="Abadi MT Condensed Extra Bold" charset="0"/>
+              </a:rPr>
+              <a:t>now,</a:t>
+            </a:r>
+            <a:r>
+              <a:rPr lang="zh-CN" altLang="en-US" sz="1600" dirty="0" smtClean="0">
+                <a:solidFill>
+                  <a:schemeClr val="accent1">
+                    <a:lumMod val="50000"/>
+                  </a:schemeClr>
+                </a:solidFill>
+                <a:latin typeface="Abadi MT Condensed Extra Bold" charset="0"/>
+                <a:ea typeface="Abadi MT Condensed Extra Bold" charset="0"/>
+                <a:cs typeface="Abadi MT Condensed Extra Bold" charset="0"/>
+              </a:rPr>
+              <a:t> </a:t>
+            </a:r>
+            <a:r>
+              <a:rPr lang="en-US" altLang="zh-CN" sz="1600" dirty="0" smtClean="0">
+                <a:solidFill>
+                  <a:schemeClr val="accent1">
+                    <a:lumMod val="50000"/>
+                  </a:schemeClr>
+                </a:solidFill>
+                <a:latin typeface="Abadi MT Condensed Extra Bold" charset="0"/>
+                <a:ea typeface="Abadi MT Condensed Extra Bold" charset="0"/>
+                <a:cs typeface="Abadi MT Condensed Extra Bold" charset="0"/>
+              </a:rPr>
+              <a:t>cause</a:t>
+            </a:r>
+            <a:r>
+              <a:rPr lang="zh-CN" altLang="en-US" sz="1600" dirty="0" smtClean="0">
+                <a:solidFill>
+                  <a:schemeClr val="accent1">
+                    <a:lumMod val="50000"/>
+                  </a:schemeClr>
+                </a:solidFill>
+                <a:latin typeface="Abadi MT Condensed Extra Bold" charset="0"/>
+                <a:ea typeface="Abadi MT Condensed Extra Bold" charset="0"/>
+                <a:cs typeface="Abadi MT Condensed Extra Bold" charset="0"/>
+              </a:rPr>
+              <a:t> </a:t>
+            </a:r>
+            <a:r>
+              <a:rPr lang="en-US" altLang="zh-CN" sz="1600" dirty="0" smtClean="0">
+                <a:solidFill>
+                  <a:schemeClr val="accent1">
+                    <a:lumMod val="50000"/>
+                  </a:schemeClr>
+                </a:solidFill>
+                <a:latin typeface="Abadi MT Condensed Extra Bold" charset="0"/>
+                <a:ea typeface="Abadi MT Condensed Extra Bold" charset="0"/>
+                <a:cs typeface="Abadi MT Condensed Extra Bold" charset="0"/>
+              </a:rPr>
+              <a:t>when</a:t>
+            </a:r>
+            <a:r>
+              <a:rPr lang="zh-CN" altLang="en-US" sz="1600" dirty="0" smtClean="0">
+                <a:solidFill>
+                  <a:schemeClr val="accent1">
+                    <a:lumMod val="50000"/>
+                  </a:schemeClr>
+                </a:solidFill>
+                <a:latin typeface="Abadi MT Condensed Extra Bold" charset="0"/>
+                <a:ea typeface="Abadi MT Condensed Extra Bold" charset="0"/>
+                <a:cs typeface="Abadi MT Condensed Extra Bold" charset="0"/>
+              </a:rPr>
+              <a:t> </a:t>
+            </a:r>
+            <a:r>
+              <a:rPr lang="en-US" altLang="zh-CN" sz="1600" dirty="0" smtClean="0">
+                <a:solidFill>
+                  <a:schemeClr val="accent1">
+                    <a:lumMod val="50000"/>
+                  </a:schemeClr>
+                </a:solidFill>
+                <a:latin typeface="Abadi MT Condensed Extra Bold" charset="0"/>
+                <a:ea typeface="Abadi MT Condensed Extra Bold" charset="0"/>
+                <a:cs typeface="Abadi MT Condensed Extra Bold" charset="0"/>
+              </a:rPr>
+              <a:t>the</a:t>
+            </a:r>
+            <a:r>
+              <a:rPr lang="zh-CN" altLang="en-US" sz="1600" dirty="0" smtClean="0">
+                <a:solidFill>
+                  <a:schemeClr val="accent1">
+                    <a:lumMod val="50000"/>
+                  </a:schemeClr>
+                </a:solidFill>
+                <a:latin typeface="Abadi MT Condensed Extra Bold" charset="0"/>
+                <a:ea typeface="Abadi MT Condensed Extra Bold" charset="0"/>
+                <a:cs typeface="Abadi MT Condensed Extra Bold" charset="0"/>
+              </a:rPr>
+              <a:t> </a:t>
+            </a:r>
+            <a:r>
+              <a:rPr lang="en-US" altLang="zh-CN" sz="1600" dirty="0" smtClean="0">
+                <a:solidFill>
+                  <a:schemeClr val="accent1">
+                    <a:lumMod val="50000"/>
+                  </a:schemeClr>
+                </a:solidFill>
+                <a:latin typeface="Abadi MT Condensed Extra Bold" charset="0"/>
+                <a:ea typeface="Abadi MT Condensed Extra Bold" charset="0"/>
+                <a:cs typeface="Abadi MT Condensed Extra Bold" charset="0"/>
+              </a:rPr>
+              <a:t>screen</a:t>
+            </a:r>
+            <a:r>
+              <a:rPr lang="zh-CN" altLang="en-US" sz="1600" dirty="0" smtClean="0">
+                <a:solidFill>
+                  <a:schemeClr val="accent1">
+                    <a:lumMod val="50000"/>
+                  </a:schemeClr>
+                </a:solidFill>
+                <a:latin typeface="Abadi MT Condensed Extra Bold" charset="0"/>
+                <a:ea typeface="Abadi MT Condensed Extra Bold" charset="0"/>
+                <a:cs typeface="Abadi MT Condensed Extra Bold" charset="0"/>
+              </a:rPr>
+              <a:t> </a:t>
+            </a:r>
+            <a:r>
+              <a:rPr lang="en-US" altLang="zh-CN" sz="1600" dirty="0" smtClean="0">
+                <a:solidFill>
+                  <a:schemeClr val="accent1">
+                    <a:lumMod val="50000"/>
+                  </a:schemeClr>
+                </a:solidFill>
+                <a:latin typeface="Abadi MT Condensed Extra Bold" charset="0"/>
+                <a:ea typeface="Abadi MT Condensed Extra Bold" charset="0"/>
+                <a:cs typeface="Abadi MT Condensed Extra Bold" charset="0"/>
+              </a:rPr>
+              <a:t>size</a:t>
+            </a:r>
+            <a:r>
+              <a:rPr lang="zh-CN" altLang="en-US" sz="1600" dirty="0" smtClean="0">
+                <a:solidFill>
+                  <a:schemeClr val="accent1">
+                    <a:lumMod val="50000"/>
+                  </a:schemeClr>
+                </a:solidFill>
+                <a:latin typeface="Abadi MT Condensed Extra Bold" charset="0"/>
+                <a:ea typeface="Abadi MT Condensed Extra Bold" charset="0"/>
+                <a:cs typeface="Abadi MT Condensed Extra Bold" charset="0"/>
+              </a:rPr>
+              <a:t> </a:t>
+            </a:r>
+            <a:r>
+              <a:rPr lang="en-US" altLang="zh-CN" sz="1600" dirty="0" smtClean="0">
+                <a:solidFill>
+                  <a:schemeClr val="accent1">
+                    <a:lumMod val="50000"/>
+                  </a:schemeClr>
+                </a:solidFill>
+                <a:latin typeface="Abadi MT Condensed Extra Bold" charset="0"/>
+                <a:ea typeface="Abadi MT Condensed Extra Bold" charset="0"/>
+                <a:cs typeface="Abadi MT Condensed Extra Bold" charset="0"/>
+              </a:rPr>
+              <a:t>changes,</a:t>
+            </a:r>
+            <a:r>
+              <a:rPr lang="zh-CN" altLang="en-US" sz="1600" dirty="0" smtClean="0">
+                <a:solidFill>
+                  <a:schemeClr val="accent1">
+                    <a:lumMod val="50000"/>
+                  </a:schemeClr>
+                </a:solidFill>
+                <a:latin typeface="Abadi MT Condensed Extra Bold" charset="0"/>
+                <a:ea typeface="Abadi MT Condensed Extra Bold" charset="0"/>
+                <a:cs typeface="Abadi MT Condensed Extra Bold" charset="0"/>
+              </a:rPr>
+              <a:t> </a:t>
+            </a:r>
+            <a:r>
+              <a:rPr lang="en-US" altLang="zh-CN" sz="1600" dirty="0" smtClean="0">
+                <a:solidFill>
+                  <a:schemeClr val="accent1">
+                    <a:lumMod val="50000"/>
+                  </a:schemeClr>
+                </a:solidFill>
+                <a:latin typeface="Abadi MT Condensed Extra Bold" charset="0"/>
+                <a:ea typeface="Abadi MT Condensed Extra Bold" charset="0"/>
+                <a:cs typeface="Abadi MT Condensed Extra Bold" charset="0"/>
+              </a:rPr>
+              <a:t>the</a:t>
+            </a:r>
+            <a:r>
+              <a:rPr lang="zh-CN" altLang="en-US" sz="1600" dirty="0" smtClean="0">
+                <a:solidFill>
+                  <a:schemeClr val="accent1">
+                    <a:lumMod val="50000"/>
+                  </a:schemeClr>
+                </a:solidFill>
+                <a:latin typeface="Abadi MT Condensed Extra Bold" charset="0"/>
+                <a:ea typeface="Abadi MT Condensed Extra Bold" charset="0"/>
+                <a:cs typeface="Abadi MT Condensed Extra Bold" charset="0"/>
+              </a:rPr>
+              <a:t> </a:t>
+            </a:r>
+            <a:r>
+              <a:rPr lang="en-US" altLang="zh-CN" sz="1600" dirty="0" smtClean="0">
+                <a:solidFill>
+                  <a:schemeClr val="accent1">
+                    <a:lumMod val="50000"/>
+                  </a:schemeClr>
+                </a:solidFill>
+                <a:latin typeface="Abadi MT Condensed Extra Bold" charset="0"/>
+                <a:ea typeface="Abadi MT Condensed Extra Bold" charset="0"/>
+                <a:cs typeface="Abadi MT Condensed Extra Bold" charset="0"/>
+              </a:rPr>
+              <a:t>map</a:t>
+            </a:r>
+            <a:r>
+              <a:rPr lang="zh-CN" altLang="en-US" sz="1600" dirty="0" smtClean="0">
+                <a:solidFill>
+                  <a:schemeClr val="accent1">
+                    <a:lumMod val="50000"/>
+                  </a:schemeClr>
+                </a:solidFill>
+                <a:latin typeface="Abadi MT Condensed Extra Bold" charset="0"/>
+                <a:ea typeface="Abadi MT Condensed Extra Bold" charset="0"/>
+                <a:cs typeface="Abadi MT Condensed Extra Bold" charset="0"/>
+              </a:rPr>
+              <a:t> </a:t>
+            </a:r>
+            <a:r>
+              <a:rPr lang="en-US" altLang="zh-CN" sz="1600" dirty="0" smtClean="0">
+                <a:solidFill>
+                  <a:schemeClr val="accent1">
+                    <a:lumMod val="50000"/>
+                  </a:schemeClr>
+                </a:solidFill>
+                <a:latin typeface="Abadi MT Condensed Extra Bold" charset="0"/>
+                <a:ea typeface="Abadi MT Condensed Extra Bold" charset="0"/>
+                <a:cs typeface="Abadi MT Condensed Extra Bold" charset="0"/>
+              </a:rPr>
+              <a:t>can’t</a:t>
+            </a:r>
+            <a:r>
+              <a:rPr lang="zh-CN" altLang="en-US" sz="1600" dirty="0" smtClean="0">
+                <a:solidFill>
+                  <a:schemeClr val="accent1">
+                    <a:lumMod val="50000"/>
+                  </a:schemeClr>
+                </a:solidFill>
+                <a:latin typeface="Abadi MT Condensed Extra Bold" charset="0"/>
+                <a:ea typeface="Abadi MT Condensed Extra Bold" charset="0"/>
+                <a:cs typeface="Abadi MT Condensed Extra Bold" charset="0"/>
+              </a:rPr>
+              <a:t> </a:t>
+            </a:r>
+            <a:r>
+              <a:rPr lang="en-US" altLang="zh-CN" sz="1600" dirty="0" smtClean="0">
+                <a:solidFill>
+                  <a:schemeClr val="accent1">
+                    <a:lumMod val="50000"/>
+                  </a:schemeClr>
+                </a:solidFill>
+                <a:latin typeface="Abadi MT Condensed Extra Bold" charset="0"/>
+                <a:ea typeface="Abadi MT Condensed Extra Bold" charset="0"/>
+                <a:cs typeface="Abadi MT Condensed Extra Bold" charset="0"/>
+              </a:rPr>
+              <a:t>fit</a:t>
+            </a:r>
+            <a:endParaRPr lang="en-US" altLang="zh-CN" sz="1600" dirty="0">
+              <a:solidFill>
+                <a:schemeClr val="accent1">
+                  <a:lumMod val="50000"/>
+                </a:schemeClr>
+              </a:solidFill>
+              <a:latin typeface="Abadi MT Condensed Extra Bold" charset="0"/>
+              <a:ea typeface="Abadi MT Condensed Extra Bold" charset="0"/>
+              <a:cs typeface="Abadi MT Condensed Extra Bold" charset="0"/>
+            </a:endParaRPr>
+          </a:p>
+          <a:p>
+            <a:pPr lvl="1"/>
+            <a:r>
+              <a:rPr lang="en-US" altLang="zh-CN" sz="1600" dirty="0" smtClean="0">
+                <a:solidFill>
+                  <a:schemeClr val="accent1">
+                    <a:lumMod val="50000"/>
+                  </a:schemeClr>
+                </a:solidFill>
+                <a:latin typeface="Abadi MT Condensed Extra Bold" charset="0"/>
+                <a:ea typeface="Abadi MT Condensed Extra Bold" charset="0"/>
+                <a:cs typeface="Abadi MT Condensed Extra Bold" charset="0"/>
+              </a:rPr>
+              <a:t>the</a:t>
+            </a:r>
+            <a:r>
+              <a:rPr lang="zh-CN" altLang="en-US" sz="1600" dirty="0" smtClean="0">
+                <a:solidFill>
+                  <a:schemeClr val="accent1">
+                    <a:lumMod val="50000"/>
+                  </a:schemeClr>
+                </a:solidFill>
+                <a:latin typeface="Abadi MT Condensed Extra Bold" charset="0"/>
+                <a:ea typeface="Abadi MT Condensed Extra Bold" charset="0"/>
+                <a:cs typeface="Abadi MT Condensed Extra Bold" charset="0"/>
+              </a:rPr>
+              <a:t> </a:t>
+            </a:r>
+            <a:r>
+              <a:rPr lang="en-US" altLang="zh-CN" sz="1600" dirty="0" smtClean="0">
+                <a:solidFill>
+                  <a:schemeClr val="accent1">
+                    <a:lumMod val="50000"/>
+                  </a:schemeClr>
+                </a:solidFill>
+                <a:latin typeface="Abadi MT Condensed Extra Bold" charset="0"/>
+                <a:ea typeface="Abadi MT Condensed Extra Bold" charset="0"/>
+                <a:cs typeface="Abadi MT Condensed Extra Bold" charset="0"/>
+              </a:rPr>
+              <a:t>size</a:t>
+            </a:r>
+            <a:r>
+              <a:rPr lang="zh-CN" altLang="en-US" sz="1600" dirty="0" smtClean="0">
+                <a:solidFill>
+                  <a:schemeClr val="accent1">
+                    <a:lumMod val="50000"/>
+                  </a:schemeClr>
+                </a:solidFill>
+                <a:latin typeface="Abadi MT Condensed Extra Bold" charset="0"/>
+                <a:ea typeface="Abadi MT Condensed Extra Bold" charset="0"/>
+                <a:cs typeface="Abadi MT Condensed Extra Bold" charset="0"/>
+              </a:rPr>
+              <a:t> </a:t>
+            </a:r>
+            <a:r>
+              <a:rPr lang="en-US" altLang="zh-CN" sz="1600" dirty="0" smtClean="0">
+                <a:solidFill>
+                  <a:schemeClr val="accent1">
+                    <a:lumMod val="50000"/>
+                  </a:schemeClr>
+                </a:solidFill>
+                <a:latin typeface="Abadi MT Condensed Extra Bold" charset="0"/>
+                <a:ea typeface="Abadi MT Condensed Extra Bold" charset="0"/>
+                <a:cs typeface="Abadi MT Condensed Extra Bold" charset="0"/>
+              </a:rPr>
+              <a:t>of</a:t>
+            </a:r>
+            <a:r>
+              <a:rPr lang="zh-CN" altLang="en-US" sz="1600" dirty="0" smtClean="0">
+                <a:solidFill>
+                  <a:schemeClr val="accent1">
+                    <a:lumMod val="50000"/>
+                  </a:schemeClr>
+                </a:solidFill>
+                <a:latin typeface="Abadi MT Condensed Extra Bold" charset="0"/>
+                <a:ea typeface="Abadi MT Condensed Extra Bold" charset="0"/>
+                <a:cs typeface="Abadi MT Condensed Extra Bold" charset="0"/>
+              </a:rPr>
+              <a:t> </a:t>
+            </a:r>
+            <a:r>
+              <a:rPr lang="en-US" altLang="zh-CN" sz="1600" smtClean="0">
+                <a:solidFill>
+                  <a:schemeClr val="accent1">
+                    <a:lumMod val="50000"/>
+                  </a:schemeClr>
+                </a:solidFill>
+                <a:latin typeface="Abadi MT Condensed Extra Bold" charset="0"/>
+                <a:ea typeface="Abadi MT Condensed Extra Bold" charset="0"/>
+                <a:cs typeface="Abadi MT Condensed Extra Bold" charset="0"/>
+              </a:rPr>
+              <a:t>SVG</a:t>
+            </a:r>
+            <a:endParaRPr lang="en-US" altLang="zh-CN" sz="1600" dirty="0" smtClean="0">
+              <a:solidFill>
+                <a:schemeClr val="accent1">
+                  <a:lumMod val="50000"/>
+                </a:schemeClr>
+              </a:solidFill>
+              <a:latin typeface="Abadi MT Condensed Extra Bold" charset="0"/>
+              <a:ea typeface="Abadi MT Condensed Extra Bold" charset="0"/>
+              <a:cs typeface="Abadi MT Condensed Extra Bold" charset="0"/>
+            </a:endParaRPr>
           </a:p>
           <a:p>
             <a:r>

</xml_diff>